<commit_message>
Alteraçao no arquivo power point ajustes
</commit_message>
<xml_diff>
--- a/Data Science Journey -IBM -Robson Cruz.pptx
+++ b/Data Science Journey -IBM -Robson Cruz.pptx
@@ -308,7 +308,7 @@
           <a:p>
             <a:fld id="{1D8BD707-D9CF-40AE-B4C6-C98DA3205C09}" type="datetimeFigureOut">
               <a:rPr lang="en-US"/>
-              <a:t>11/1/2022</a:t>
+              <a:t>11/2/2022</a:t>
             </a:fld>
             <a:endParaRPr lang="en-US"/>
           </a:p>
@@ -491,7 +491,7 @@
           <a:p>
             <a:fld id="{1D8BD707-D9CF-40AE-B4C6-C98DA3205C09}" type="datetimeFigureOut">
               <a:rPr lang="en-US"/>
-              <a:t>11/1/2022</a:t>
+              <a:t>11/2/2022</a:t>
             </a:fld>
             <a:endParaRPr lang="en-US"/>
           </a:p>
@@ -711,7 +711,7 @@
           <a:p>
             <a:fld id="{1D8BD707-D9CF-40AE-B4C6-C98DA3205C09}" type="datetimeFigureOut">
               <a:rPr lang="en-US"/>
-              <a:t>11/1/2022</a:t>
+              <a:t>11/2/2022</a:t>
             </a:fld>
             <a:endParaRPr lang="en-US"/>
           </a:p>
@@ -1015,7 +1015,7 @@
           <a:p>
             <a:fld id="{1D8BD707-D9CF-40AE-B4C6-C98DA3205C09}" type="datetimeFigureOut">
               <a:rPr lang="en-US"/>
-              <a:t>11/1/2022</a:t>
+              <a:t>11/2/2022</a:t>
             </a:fld>
             <a:endParaRPr lang="en-US"/>
           </a:p>
@@ -1290,7 +1290,7 @@
           <a:p>
             <a:fld id="{1D8BD707-D9CF-40AE-B4C6-C98DA3205C09}" type="datetimeFigureOut">
               <a:rPr lang="en-US"/>
-              <a:t>11/1/2022</a:t>
+              <a:t>11/2/2022</a:t>
             </a:fld>
             <a:endParaRPr lang="en-US"/>
           </a:p>
@@ -1621,7 +1621,7 @@
           <a:p>
             <a:fld id="{1D8BD707-D9CF-40AE-B4C6-C98DA3205C09}" type="datetimeFigureOut">
               <a:rPr lang="en-US"/>
-              <a:t>11/1/2022</a:t>
+              <a:t>11/2/2022</a:t>
             </a:fld>
             <a:endParaRPr lang="en-US"/>
           </a:p>
@@ -2337,7 +2337,7 @@
         <p:spPr>
           <a:xfrm>
             <a:off x="467361" y="2091819"/>
-            <a:ext cx="11734799" cy="4082656"/>
+            <a:ext cx="11734799" cy="3998018"/>
           </a:xfrm>
           <a:prstGeom prst="rect">
             <a:avLst/>
@@ -2613,6 +2613,20 @@
               </a:rPr>
               <a:t> </a:t>
             </a:r>
+            <a:endParaRPr lang="pt-BR" sz="2000" spc="-5" dirty="0">
+              <a:solidFill>
+                <a:srgbClr val="404040"/>
+              </a:solidFill>
+              <a:latin typeface="Carlito"/>
+              <a:cs typeface="Carlito"/>
+            </a:endParaRPr>
+          </a:p>
+          <a:p>
+            <a:pPr marL="16510" marR="1900555">
+              <a:lnSpc>
+                <a:spcPct val="148000"/>
+              </a:lnSpc>
+            </a:pPr>
             <a:r>
               <a:rPr lang="en-IN" sz="2000" u="heavy" spc="-5" dirty="0">
                 <a:solidFill>
@@ -2627,7 +2641,7 @@
                 <a:cs typeface="Carlito"/>
                 <a:hlinkClick r:id="rId2"/>
               </a:rPr>
-              <a:t>https://github.com/navassherif98/IBM_Data_Science_Professional_Certification/blob/master/10.Applied_Data_Science_Capstone/Week%201%20Introduction/Data%20wrangling%20.ipynb</a:t>
+              <a:t>https://github.com/yraion/IBM-Data-Science/blob/master/03-labs-jupyter-spacex-Data%20wrangling.ipynb</a:t>
             </a:r>
             <a:endParaRPr sz="2000" dirty="0">
               <a:latin typeface="Carlito"/>
@@ -2920,7 +2934,7 @@
         <p:spPr>
           <a:xfrm>
             <a:off x="1176019" y="1824608"/>
-            <a:ext cx="9963150" cy="4877617"/>
+            <a:ext cx="9963150" cy="4313360"/>
           </a:xfrm>
           <a:prstGeom prst="rect">
             <a:avLst/>
@@ -3231,22 +3245,12 @@
                 <a:latin typeface="Carlito"/>
                 <a:cs typeface="Carlito"/>
               </a:rPr>
-              <a:t>url: </a:t>
-            </a:r>
-            <a:r>
-              <a:rPr sz="2000" spc="-5" dirty="0">
+              <a:t>url:</a:t>
+            </a:r>
+            <a:r>
+              <a:rPr lang="pt-BR" sz="2000" u="heavy" spc="-5" dirty="0">
                 <a:solidFill>
                   <a:srgbClr val="404040"/>
-                </a:solidFill>
-                <a:latin typeface="Carlito"/>
-                <a:cs typeface="Carlito"/>
-              </a:rPr>
-              <a:t> </a:t>
-            </a:r>
-            <a:r>
-              <a:rPr lang="en-IN" sz="2000" u="heavy" spc="-10" dirty="0">
-                <a:solidFill>
-                  <a:srgbClr val="2996E1"/>
                 </a:solidFill>
                 <a:uFill>
                   <a:solidFill>
@@ -3255,9 +3259,24 @@
                 </a:uFill>
                 <a:latin typeface="Carlito"/>
                 <a:cs typeface="Carlito"/>
+              </a:rPr>
+              <a:t> </a:t>
+            </a:r>
+            <a:r>
+              <a:rPr lang="pt-BR" sz="2000" u="heavy" spc="-5" dirty="0">
+                <a:solidFill>
+                  <a:srgbClr val="404040"/>
+                </a:solidFill>
+                <a:uFill>
+                  <a:solidFill>
+                    <a:srgbClr val="404040"/>
+                  </a:solidFill>
+                </a:uFill>
+                <a:latin typeface="Carlito"/>
+                <a:cs typeface="Carlito"/>
                 <a:hlinkClick r:id="rId2"/>
               </a:rPr>
-              <a:t>https://github.com/navassherif98/IBM_Data_Science_Professional_Certification/blob/master/10.Applied_Data_Science_Capstone/Week%202%20EDA/EDA%20with%20Visualization.ipynb</a:t>
+              <a:t>https://github.com/yraion/IBM-Data-Science/blob/master/06-jupyter-labs-eda-dataviz.ipynb</a:t>
             </a:r>
             <a:endParaRPr sz="2000" dirty="0">
               <a:latin typeface="Carlito"/>
@@ -3561,7 +3580,7 @@
         <p:spPr>
           <a:xfrm>
             <a:off x="1176019" y="1622485"/>
-            <a:ext cx="9687560" cy="3531993"/>
+            <a:ext cx="9687560" cy="3073405"/>
           </a:xfrm>
           <a:prstGeom prst="rect">
             <a:avLst/>
@@ -3716,7 +3735,7 @@
                 <a:cs typeface="Carlito"/>
                 <a:hlinkClick r:id="rId2"/>
               </a:rPr>
-              <a:t>https://github.com/navassherif98/IBM_Data_Science_Professional_Certification/blob/master/10.Applied_Data_Science_Capstone/Week%202%20EDA/EDA%20with%20SQL.ipynb</a:t>
+              <a:t>https://github.com/yraion/IBM-Data-Science/blob/master/04-jupyter-labs-eda-sql-coursera.ipynb</a:t>
             </a:r>
             <a:endParaRPr sz="2000" dirty="0">
               <a:latin typeface="Carlito"/>
@@ -4032,7 +4051,7 @@
         <p:spPr>
           <a:xfrm>
             <a:off x="1176019" y="1824608"/>
-            <a:ext cx="9765665" cy="3226909"/>
+            <a:ext cx="9765665" cy="2133276"/>
           </a:xfrm>
           <a:prstGeom prst="rect">
             <a:avLst/>
@@ -4177,26 +4196,12 @@
                 <a:latin typeface="Carlito"/>
                 <a:cs typeface="Carlito"/>
               </a:rPr>
-              <a:t>url:</a:t>
-            </a:r>
-            <a:endParaRPr sz="2000" dirty="0">
-              <a:latin typeface="Carlito"/>
-              <a:cs typeface="Carlito"/>
-            </a:endParaRPr>
-          </a:p>
-          <a:p>
-            <a:pPr marL="12700" marR="7620">
-              <a:lnSpc>
-                <a:spcPct val="150100"/>
-              </a:lnSpc>
-              <a:spcBef>
-                <a:spcPts val="300"/>
-              </a:spcBef>
-            </a:pPr>
-            <a:r>
-              <a:rPr lang="en-IN" sz="2000" u="heavy" spc="-10" dirty="0">
-                <a:solidFill>
-                  <a:srgbClr val="2996E1"/>
+              <a:t>url</a:t>
+            </a:r>
+            <a:r>
+              <a:rPr sz="2000" u="heavy" spc="-5" dirty="0">
+                <a:solidFill>
+                  <a:srgbClr val="404040"/>
                 </a:solidFill>
                 <a:uFill>
                   <a:solidFill>
@@ -4207,7 +4212,23 @@
                 <a:cs typeface="Carlito"/>
                 <a:hlinkClick r:id="rId2"/>
               </a:rPr>
-              <a:t>https://github.com/navassherif98/IBM_Data_Science_Professional_Certification/blob/master/10.Applied_Data_Science_Capstone/Week%203%20Interactive%20Visual%20Analytics%20and%20Dashboard/Interactive%20Visual%20Analytics%20with%20Folium.ipynb</a:t>
+              <a:t>:</a:t>
+            </a:r>
+            <a:r>
+              <a:rPr lang="pt-BR" sz="2000" u="heavy" spc="-5" dirty="0">
+                <a:solidFill>
+                  <a:srgbClr val="404040"/>
+                </a:solidFill>
+                <a:uFill>
+                  <a:solidFill>
+                    <a:srgbClr val="404040"/>
+                  </a:solidFill>
+                </a:uFill>
+                <a:latin typeface="Carlito"/>
+                <a:cs typeface="Carlito"/>
+                <a:hlinkClick r:id="rId2"/>
+              </a:rPr>
+              <a:t> https://github.com/yraion/IBM-Data-Science/blob/master/07-lab_jupyter_launch_site_location.ipynb</a:t>
             </a:r>
             <a:endParaRPr sz="2000" dirty="0">
               <a:latin typeface="Carlito"/>
@@ -4523,7 +4544,7 @@
         <p:spPr>
           <a:xfrm>
             <a:off x="609600" y="1676247"/>
-            <a:ext cx="11430000" cy="5351209"/>
+            <a:ext cx="11430000" cy="4001095"/>
           </a:xfrm>
           <a:prstGeom prst="rect">
             <a:avLst/>
@@ -4688,35 +4709,21 @@
               </a:rPr>
               <a:t>url:</a:t>
             </a:r>
-            <a:endParaRPr sz="2000" dirty="0">
-              <a:latin typeface="Carlito"/>
-              <a:cs typeface="Carlito"/>
-            </a:endParaRPr>
-          </a:p>
-          <a:p>
-            <a:pPr marL="12700" marR="1557020">
-              <a:lnSpc>
-                <a:spcPct val="150000"/>
-              </a:lnSpc>
-              <a:spcBef>
-                <a:spcPts val="95"/>
-              </a:spcBef>
-            </a:pPr>
-            <a:r>
-              <a:rPr lang="en-IN" sz="2000" u="heavy" spc="-10" dirty="0">
-                <a:solidFill>
-                  <a:srgbClr val="2996E1"/>
+            <a:r>
+              <a:rPr lang="pt-BR" sz="2000" u="heavy" spc="-5" dirty="0">
+                <a:solidFill>
+                  <a:srgbClr val="404040"/>
                 </a:solidFill>
                 <a:uFill>
                   <a:solidFill>
-                    <a:srgbClr val="2996E1"/>
+                    <a:srgbClr val="404040"/>
                   </a:solidFill>
                 </a:uFill>
                 <a:latin typeface="Carlito"/>
                 <a:cs typeface="Carlito"/>
                 <a:hlinkClick r:id="rId2"/>
               </a:rPr>
-              <a:t>https://github.com/navassherif98/IBM_Data_Science_Professional_Certification/blob/master/10.Applied_Data_Science_Capstone/Week%203%20Interactive%20Visual%20Analytics%20and%20Dashboard/spacex_dash_app.py</a:t>
+              <a:t>https://github.com/yraion/IBM-Data-Science/blob/master/06-jupyter-labs-eda-dataviz.ipynb</a:t>
             </a:r>
             <a:endParaRPr sz="2000" dirty="0">
               <a:latin typeface="Carlito"/>
@@ -4985,8 +4992,8 @@
         </p:nvSpPr>
         <p:spPr>
           <a:xfrm>
-            <a:off x="533401" y="2472309"/>
-            <a:ext cx="3061208" cy="2796278"/>
+            <a:off x="154871" y="2514256"/>
+            <a:ext cx="3617721" cy="1552348"/>
           </a:xfrm>
           <a:prstGeom prst="rect">
             <a:avLst/>
@@ -5022,7 +5029,7 @@
               <a:t>GitHub</a:t>
             </a:r>
             <a:r>
-              <a:rPr sz="2000" u="heavy" spc="-95" dirty="0">
+              <a:rPr lang="pt-BR" sz="2000" u="heavy" dirty="0">
                 <a:solidFill>
                   <a:srgbClr val="404040"/>
                 </a:solidFill>
@@ -5048,8 +5055,25 @@
                 </a:uFill>
                 <a:latin typeface="Carlito"/>
                 <a:cs typeface="Carlito"/>
+                <a:hlinkClick r:id="rId2"/>
               </a:rPr>
               <a:t>url:</a:t>
+            </a:r>
+            <a:r>
+              <a:rPr lang="pt-BR" sz="2000" u="heavy" spc="-5" dirty="0">
+                <a:solidFill>
+                  <a:srgbClr val="404040"/>
+                </a:solidFill>
+                <a:uFill>
+                  <a:solidFill>
+                    <a:srgbClr val="404040"/>
+                  </a:solidFill>
+                </a:uFill>
+                <a:latin typeface="Carlito"/>
+                <a:cs typeface="Carlito"/>
+                <a:hlinkClick r:id="rId2"/>
+              </a:rPr>
+              <a:t>https://github.com/yraion/IBM-Data-Science/blob/master/08-SpaceX_Machine%20Learning%20Prediction_Part_5.ipynb</a:t>
             </a:r>
             <a:endParaRPr lang="en-IN" sz="2000" u="heavy" spc="-5" dirty="0">
               <a:solidFill>
@@ -5060,28 +5084,6 @@
                   <a:srgbClr val="404040"/>
                 </a:solidFill>
               </a:uFill>
-              <a:latin typeface="Carlito"/>
-              <a:cs typeface="Carlito"/>
-            </a:endParaRPr>
-          </a:p>
-          <a:p>
-            <a:pPr marL="12700">
-              <a:lnSpc>
-                <a:spcPct val="100000"/>
-              </a:lnSpc>
-              <a:spcBef>
-                <a:spcPts val="105"/>
-              </a:spcBef>
-            </a:pPr>
-            <a:r>
-              <a:rPr lang="en-IN" sz="2000" dirty="0">
-                <a:latin typeface="Carlito"/>
-                <a:cs typeface="Carlito"/>
-                <a:hlinkClick r:id="rId2"/>
-              </a:rPr>
-              <a:t>https://github.com/navassherif98/IBM_Data_Science_Professional_Certification/blob/master/10.Applied_Data_Science_Capstone/Week%204%20Predictive%20Analysis%20(Classification)/Machine%20Learning%20Prediction.ipynb</a:t>
-            </a:r>
-            <a:endParaRPr sz="2000" dirty="0">
               <a:latin typeface="Carlito"/>
               <a:cs typeface="Carlito"/>
             </a:endParaRPr>
@@ -8968,7 +8970,7 @@
                 <a:latin typeface="Bahnschrift Condensed" panose="020B0502040204020203" pitchFamily="34" charset="0"/>
                 <a:cs typeface="Arial"/>
               </a:rPr>
-              <a:t>   com </a:t>
+              <a:t>   c  o  m </a:t>
             </a:r>
             <a:r>
               <a:rPr sz="7200" spc="-1270" dirty="0">
@@ -8979,6 +8981,16 @@
                 <a:cs typeface="Arial"/>
               </a:rPr>
               <a:t> </a:t>
+            </a:r>
+            <a:r>
+              <a:rPr lang="pt-BR" sz="7200" spc="-1270" dirty="0">
+                <a:solidFill>
+                  <a:srgbClr val="242424"/>
+                </a:solidFill>
+                <a:latin typeface="Bahnschrift Condensed" panose="020B0502040204020203" pitchFamily="34" charset="0"/>
+                <a:cs typeface="Arial"/>
+              </a:rPr>
+              <a:t>  </a:t>
             </a:r>
             <a:r>
               <a:rPr sz="7200" spc="-425" dirty="0" err="1">
@@ -10444,7 +10456,7 @@
         <p:spPr>
           <a:xfrm>
             <a:off x="6288404" y="2168423"/>
-            <a:ext cx="2814320" cy="2569845"/>
+            <a:ext cx="2814320" cy="2646237"/>
           </a:xfrm>
           <a:prstGeom prst="rect">
             <a:avLst/>
@@ -10471,52 +10483,15 @@
               </a:tabLst>
             </a:pPr>
             <a:r>
-              <a:rPr sz="2200" spc="-30" dirty="0">
+              <a:rPr lang="pt-BR" sz="2200" spc="-30" dirty="0">
                 <a:solidFill>
                   <a:schemeClr val="accent6"/>
                 </a:solidFill>
                 <a:latin typeface="Carlito"/>
                 <a:cs typeface="Carlito"/>
               </a:rPr>
-              <a:t>Executive </a:t>
-            </a:r>
-            <a:r>
-              <a:rPr sz="2200" spc="-15" dirty="0">
-                <a:solidFill>
-                  <a:schemeClr val="accent6"/>
-                </a:solidFill>
-                <a:latin typeface="Carlito"/>
-                <a:cs typeface="Carlito"/>
-              </a:rPr>
-              <a:t>Summary</a:t>
-            </a:r>
-            <a:r>
-              <a:rPr sz="2200" spc="-10" dirty="0">
-                <a:solidFill>
-                  <a:schemeClr val="accent6"/>
-                </a:solidFill>
-                <a:latin typeface="Carlito"/>
-                <a:cs typeface="Carlito"/>
-              </a:rPr>
-              <a:t> </a:t>
-            </a:r>
-            <a:r>
-              <a:rPr sz="2200" spc="-15" dirty="0">
-                <a:solidFill>
-                  <a:schemeClr val="accent6"/>
-                </a:solidFill>
-                <a:latin typeface="Carlito"/>
-                <a:cs typeface="Carlito"/>
-              </a:rPr>
-              <a:t>(3)</a:t>
-            </a:r>
-            <a:endParaRPr sz="2200" dirty="0">
-              <a:solidFill>
-                <a:schemeClr val="accent6"/>
-              </a:solidFill>
-              <a:latin typeface="Carlito"/>
-              <a:cs typeface="Carlito"/>
-            </a:endParaRPr>
+              <a:t>Sumario Executivo (3)</a:t>
+            </a:r>
           </a:p>
           <a:p>
             <a:pPr marL="241300" indent="-228600">
@@ -10524,7 +10499,7 @@
                 <a:spcPct val="100000"/>
               </a:lnSpc>
               <a:spcBef>
-                <a:spcPts val="695"/>
+                <a:spcPts val="795"/>
               </a:spcBef>
               <a:buFont typeface="Arial"/>
               <a:buChar char="•"/>
@@ -10534,42 +10509,15 @@
               </a:tabLst>
             </a:pPr>
             <a:r>
-              <a:rPr sz="2200" spc="-25" dirty="0">
+              <a:rPr lang="pt-BR" sz="2200" spc="-30" dirty="0">
                 <a:solidFill>
                   <a:schemeClr val="accent6"/>
                 </a:solidFill>
                 <a:latin typeface="Carlito"/>
                 <a:cs typeface="Carlito"/>
               </a:rPr>
-              <a:t>Introduction</a:t>
-            </a:r>
-            <a:r>
-              <a:rPr sz="2200" spc="-40" dirty="0">
-                <a:solidFill>
-                  <a:schemeClr val="accent6"/>
-                </a:solidFill>
-                <a:latin typeface="Carlito"/>
-                <a:cs typeface="Carlito"/>
-              </a:rPr>
-              <a:t> </a:t>
-            </a:r>
-            <a:r>
-              <a:rPr sz="2200" spc="-10" dirty="0">
-                <a:solidFill>
-                  <a:schemeClr val="accent6"/>
-                </a:solidFill>
-                <a:latin typeface="Carlito"/>
-                <a:cs typeface="Carlito"/>
-              </a:rPr>
-              <a:t>(4)</a:t>
-            </a:r>
-            <a:endParaRPr sz="2200" dirty="0">
-              <a:solidFill>
-                <a:schemeClr val="accent6"/>
-              </a:solidFill>
-              <a:latin typeface="Carlito"/>
-              <a:cs typeface="Carlito"/>
-            </a:endParaRPr>
+              <a:t>Introdução (4)</a:t>
+            </a:r>
           </a:p>
           <a:p>
             <a:pPr marL="241300" indent="-228600">
@@ -10577,7 +10525,7 @@
                 <a:spcPct val="100000"/>
               </a:lnSpc>
               <a:spcBef>
-                <a:spcPts val="700"/>
+                <a:spcPts val="795"/>
               </a:spcBef>
               <a:buFont typeface="Arial"/>
               <a:buChar char="•"/>
@@ -10587,42 +10535,15 @@
               </a:tabLst>
             </a:pPr>
             <a:r>
-              <a:rPr sz="2200" spc="-5" dirty="0">
+              <a:rPr lang="pt-BR" sz="2200" spc="-30" dirty="0">
                 <a:solidFill>
                   <a:schemeClr val="accent6"/>
                 </a:solidFill>
                 <a:latin typeface="Carlito"/>
                 <a:cs typeface="Carlito"/>
               </a:rPr>
-              <a:t>Methodology</a:t>
-            </a:r>
-            <a:r>
-              <a:rPr sz="2200" spc="-60" dirty="0">
-                <a:solidFill>
-                  <a:schemeClr val="accent6"/>
-                </a:solidFill>
-                <a:latin typeface="Carlito"/>
-                <a:cs typeface="Carlito"/>
-              </a:rPr>
-              <a:t> </a:t>
-            </a:r>
-            <a:r>
-              <a:rPr sz="2200" spc="-15" dirty="0">
-                <a:solidFill>
-                  <a:schemeClr val="accent6"/>
-                </a:solidFill>
-                <a:latin typeface="Carlito"/>
-                <a:cs typeface="Carlito"/>
-              </a:rPr>
-              <a:t>(6)</a:t>
-            </a:r>
-            <a:endParaRPr sz="2200" dirty="0">
-              <a:solidFill>
-                <a:schemeClr val="accent6"/>
-              </a:solidFill>
-              <a:latin typeface="Carlito"/>
-              <a:cs typeface="Carlito"/>
-            </a:endParaRPr>
+              <a:t>Metodologia (6)</a:t>
+            </a:r>
           </a:p>
           <a:p>
             <a:pPr marL="241300" indent="-228600">
@@ -10630,7 +10551,7 @@
                 <a:spcPct val="100000"/>
               </a:lnSpc>
               <a:spcBef>
-                <a:spcPts val="710"/>
+                <a:spcPts val="795"/>
               </a:spcBef>
               <a:buFont typeface="Arial"/>
               <a:buChar char="•"/>
@@ -10640,42 +10561,15 @@
               </a:tabLst>
             </a:pPr>
             <a:r>
-              <a:rPr sz="2200" spc="-25" dirty="0">
+              <a:rPr lang="pt-BR" sz="2200" spc="-30" dirty="0">
                 <a:solidFill>
                   <a:schemeClr val="accent6"/>
                 </a:solidFill>
                 <a:latin typeface="Carlito"/>
                 <a:cs typeface="Carlito"/>
               </a:rPr>
-              <a:t>Results</a:t>
-            </a:r>
-            <a:r>
-              <a:rPr sz="2200" dirty="0">
-                <a:solidFill>
-                  <a:schemeClr val="accent6"/>
-                </a:solidFill>
-                <a:latin typeface="Carlito"/>
-                <a:cs typeface="Carlito"/>
-              </a:rPr>
-              <a:t> </a:t>
-            </a:r>
-            <a:r>
-              <a:rPr sz="2200" spc="-15" dirty="0">
-                <a:solidFill>
-                  <a:schemeClr val="accent6"/>
-                </a:solidFill>
-                <a:latin typeface="Carlito"/>
-                <a:cs typeface="Carlito"/>
-              </a:rPr>
-              <a:t>(16)</a:t>
-            </a:r>
-            <a:endParaRPr sz="2200" dirty="0">
-              <a:solidFill>
-                <a:schemeClr val="accent6"/>
-              </a:solidFill>
-              <a:latin typeface="Carlito"/>
-              <a:cs typeface="Carlito"/>
-            </a:endParaRPr>
+              <a:t>Resultados (16)</a:t>
+            </a:r>
           </a:p>
           <a:p>
             <a:pPr marL="241300" indent="-228600">
@@ -10683,7 +10577,7 @@
                 <a:spcPct val="100000"/>
               </a:lnSpc>
               <a:spcBef>
-                <a:spcPts val="695"/>
+                <a:spcPts val="795"/>
               </a:spcBef>
               <a:buFont typeface="Arial"/>
               <a:buChar char="•"/>
@@ -10693,42 +10587,15 @@
               </a:tabLst>
             </a:pPr>
             <a:r>
-              <a:rPr sz="2200" spc="-10" dirty="0">
+              <a:rPr lang="pt-BR" sz="2200" spc="-30" dirty="0">
                 <a:solidFill>
                   <a:schemeClr val="accent6"/>
                 </a:solidFill>
                 <a:latin typeface="Carlito"/>
                 <a:cs typeface="Carlito"/>
               </a:rPr>
-              <a:t>Conclusion</a:t>
-            </a:r>
-            <a:r>
-              <a:rPr sz="2200" spc="-80" dirty="0">
-                <a:solidFill>
-                  <a:schemeClr val="accent6"/>
-                </a:solidFill>
-                <a:latin typeface="Carlito"/>
-                <a:cs typeface="Carlito"/>
-              </a:rPr>
-              <a:t> </a:t>
-            </a:r>
-            <a:r>
-              <a:rPr sz="2200" spc="-15" dirty="0">
-                <a:solidFill>
-                  <a:schemeClr val="accent6"/>
-                </a:solidFill>
-                <a:latin typeface="Carlito"/>
-                <a:cs typeface="Carlito"/>
-              </a:rPr>
-              <a:t>(46)</a:t>
-            </a:r>
-            <a:endParaRPr sz="2200" dirty="0">
-              <a:solidFill>
-                <a:schemeClr val="accent6"/>
-              </a:solidFill>
-              <a:latin typeface="Carlito"/>
-              <a:cs typeface="Carlito"/>
-            </a:endParaRPr>
+              <a:t>Conclusão (46)</a:t>
+            </a:r>
           </a:p>
           <a:p>
             <a:pPr marL="241300" indent="-228600">
@@ -10736,7 +10603,7 @@
                 <a:spcPct val="100000"/>
               </a:lnSpc>
               <a:spcBef>
-                <a:spcPts val="695"/>
+                <a:spcPts val="795"/>
               </a:spcBef>
               <a:buFont typeface="Arial"/>
               <a:buChar char="•"/>
@@ -10746,34 +10613,14 @@
               </a:tabLst>
             </a:pPr>
             <a:r>
-              <a:rPr sz="2200" spc="-5" dirty="0">
+              <a:rPr lang="pt-BR" sz="2200" spc="-30" dirty="0">
                 <a:solidFill>
                   <a:schemeClr val="accent6"/>
                 </a:solidFill>
                 <a:latin typeface="Carlito"/>
                 <a:cs typeface="Carlito"/>
               </a:rPr>
-              <a:t>Appendix</a:t>
-            </a:r>
-            <a:r>
-              <a:rPr sz="2200" spc="-90" dirty="0">
-                <a:solidFill>
-                  <a:schemeClr val="accent6"/>
-                </a:solidFill>
-                <a:latin typeface="Carlito"/>
-                <a:cs typeface="Carlito"/>
-              </a:rPr>
-              <a:t> </a:t>
-            </a:r>
-            <a:r>
-              <a:rPr sz="2200" spc="-15" dirty="0">
-                <a:solidFill>
-                  <a:schemeClr val="accent6"/>
-                </a:solidFill>
-                <a:latin typeface="Carlito"/>
-                <a:cs typeface="Carlito"/>
-              </a:rPr>
-              <a:t>(47)</a:t>
+              <a:t>Apêndice (47)</a:t>
             </a:r>
             <a:endParaRPr sz="2200" dirty="0">
               <a:solidFill>
@@ -16110,35 +15957,22 @@
               </a:tabLst>
             </a:pPr>
             <a:r>
-              <a:rPr u="heavy" spc="-330" dirty="0">
+              <a:rPr lang="pt-BR" u="heavy" spc="-330" dirty="0">
                 <a:uFill>
                   <a:solidFill>
                     <a:srgbClr val="7D7D7D"/>
                   </a:solidFill>
                 </a:uFill>
               </a:rPr>
-              <a:t>Executive</a:t>
-            </a:r>
-            <a:r>
-              <a:rPr u="heavy" spc="-495" dirty="0">
-                <a:uFill>
-                  <a:solidFill>
-                    <a:srgbClr val="7D7D7D"/>
-                  </a:solidFill>
-                </a:uFill>
-              </a:rPr>
-              <a:t> </a:t>
-            </a:r>
-            <a:r>
-              <a:rPr u="heavy" spc="-370" dirty="0">
-                <a:uFill>
-                  <a:solidFill>
-                    <a:srgbClr val="7D7D7D"/>
-                  </a:solidFill>
-                </a:uFill>
-              </a:rPr>
-              <a:t>Summary	</a:t>
-            </a:r>
+              <a:t>Sumario Executivo</a:t>
+            </a:r>
+            <a:endParaRPr u="heavy" spc="-370" dirty="0">
+              <a:uFill>
+                <a:solidFill>
+                  <a:srgbClr val="7D7D7D"/>
+                </a:solidFill>
+              </a:uFill>
+            </a:endParaRPr>
           </a:p>
         </p:txBody>
       </p:sp>
@@ -19776,34 +19610,14 @@
               </a:tabLst>
             </a:pPr>
             <a:r>
-              <a:rPr u="heavy" spc="-505" dirty="0">
+              <a:rPr lang="pt-BR" u="heavy" spc="-505" dirty="0">
                 <a:uFill>
                   <a:solidFill>
                     <a:srgbClr val="7D7D7D"/>
                   </a:solidFill>
                 </a:uFill>
               </a:rPr>
-              <a:t>Key </a:t>
-            </a:r>
-            <a:r>
-              <a:rPr u="heavy" spc="-270" dirty="0">
-                <a:uFill>
-                  <a:solidFill>
-                    <a:srgbClr val="7D7D7D"/>
-                  </a:solidFill>
-                </a:uFill>
-              </a:rPr>
-              <a:t>Location</a:t>
-            </a:r>
-            <a:r>
-              <a:rPr u="heavy" spc="-445" dirty="0">
-                <a:uFill>
-                  <a:solidFill>
-                    <a:srgbClr val="7D7D7D"/>
-                  </a:solidFill>
-                </a:uFill>
-              </a:rPr>
-              <a:t> </a:t>
+              <a:t>Principais Proximidades do Local </a:t>
             </a:r>
             <a:r>
               <a:rPr u="heavy" spc="-260" dirty="0">
@@ -19813,7 +19627,7 @@
                   </a:solidFill>
                 </a:uFill>
               </a:rPr>
-              <a:t>Proximities	</a:t>
+              <a:t>	</a:t>
             </a:r>
           </a:p>
         </p:txBody>
@@ -21080,6 +20894,10 @@
           </p:nvPr>
         </p:nvSpPr>
         <p:spPr>
+          <a:xfrm>
+            <a:off x="1019149" y="260984"/>
+            <a:ext cx="10153700" cy="1248290"/>
+          </a:xfrm>
           <a:prstGeom prst="rect">
             <a:avLst/>
           </a:prstGeom>
@@ -21102,55 +20920,22 @@
               </a:tabLst>
             </a:pPr>
             <a:r>
-              <a:rPr u="heavy" spc="-385" dirty="0">
+              <a:rPr lang="pt-BR" sz="4000" u="heavy" spc="-385" dirty="0">
                 <a:uFill>
                   <a:solidFill>
                     <a:srgbClr val="7D7D7D"/>
                   </a:solidFill>
                 </a:uFill>
               </a:rPr>
-              <a:t>Successful </a:t>
-            </a:r>
-            <a:r>
-              <a:rPr u="heavy" spc="-395" dirty="0">
-                <a:uFill>
-                  <a:solidFill>
-                    <a:srgbClr val="7D7D7D"/>
-                  </a:solidFill>
-                </a:uFill>
-              </a:rPr>
-              <a:t>Launches Across </a:t>
-            </a:r>
-            <a:r>
-              <a:rPr u="heavy" spc="-370" dirty="0">
-                <a:uFill>
-                  <a:solidFill>
-                    <a:srgbClr val="7D7D7D"/>
-                  </a:solidFill>
-                </a:uFill>
-              </a:rPr>
-              <a:t>Launch</a:t>
-            </a:r>
-            <a:r>
-              <a:rPr u="heavy" spc="-420" dirty="0">
-                <a:uFill>
-                  <a:solidFill>
-                    <a:srgbClr val="7D7D7D"/>
-                  </a:solidFill>
-                </a:uFill>
-              </a:rPr>
-              <a:t> </a:t>
-            </a:r>
-            <a:r>
-              <a:rPr u="heavy" spc="-380" dirty="0">
-                <a:uFill>
-                  <a:solidFill>
-                    <a:srgbClr val="7D7D7D"/>
-                  </a:solidFill>
-                </a:uFill>
-              </a:rPr>
-              <a:t>Sites	</a:t>
-            </a:r>
+              <a:t>Lançamentos bem-sucedidos nos sites de lançamento</a:t>
+            </a:r>
+            <a:endParaRPr sz="4000" u="heavy" spc="-380" dirty="0">
+              <a:uFill>
+                <a:solidFill>
+                  <a:srgbClr val="7D7D7D"/>
+                </a:solidFill>
+              </a:uFill>
+            </a:endParaRPr>
           </a:p>
         </p:txBody>
       </p:sp>
@@ -24436,7 +24221,7 @@
         <p:spPr>
           <a:xfrm>
             <a:off x="1176019" y="506095"/>
-            <a:ext cx="3244850" cy="756920"/>
+            <a:ext cx="3244850" cy="751488"/>
           </a:xfrm>
           <a:prstGeom prst="rect">
             <a:avLst/>
@@ -24458,8 +24243,13 @@
             </a:pPr>
             <a:r>
               <a:rPr spc="-670" dirty="0"/>
-              <a:t>CONCLUSION</a:t>
-            </a:r>
+              <a:t>CONCLUS</a:t>
+            </a:r>
+            <a:r>
+              <a:rPr lang="pt-BR" spc="-670" dirty="0"/>
+              <a:t>ÃO</a:t>
+            </a:r>
+            <a:endParaRPr spc="-670" dirty="0"/>
           </a:p>
         </p:txBody>
       </p:sp>
@@ -24506,7 +24296,7 @@
         <p:spPr>
           <a:xfrm>
             <a:off x="1184249" y="1746715"/>
-            <a:ext cx="9956800" cy="3692525"/>
+            <a:ext cx="9956800" cy="4512774"/>
           </a:xfrm>
           <a:prstGeom prst="rect">
             <a:avLst/>
@@ -24534,116 +24324,29 @@
               </a:tabLst>
             </a:pPr>
             <a:r>
-              <a:rPr sz="2000" dirty="0">
+              <a:rPr lang="pt-BR" sz="2000" dirty="0">
                 <a:solidFill>
                   <a:srgbClr val="404040"/>
                 </a:solidFill>
                 <a:latin typeface="Carlito"/>
                 <a:cs typeface="Carlito"/>
               </a:rPr>
-              <a:t>Our </a:t>
-            </a:r>
-            <a:r>
-              <a:rPr sz="2000" spc="-5" dirty="0">
+              <a:t>Nossa tarefa: desenvolver um modelo de aprendizado de máquina para a Space Y que deseja concorrer à </a:t>
+            </a:r>
+            <a:r>
+              <a:rPr lang="pt-BR" sz="2000" dirty="0" err="1">
                 <a:solidFill>
                   <a:srgbClr val="404040"/>
                 </a:solidFill>
                 <a:latin typeface="Carlito"/>
                 <a:cs typeface="Carlito"/>
               </a:rPr>
-              <a:t>task: </a:t>
-            </a:r>
-            <a:r>
-              <a:rPr sz="2000" spc="-20" dirty="0">
-                <a:solidFill>
-                  <a:srgbClr val="404040"/>
-                </a:solidFill>
-                <a:latin typeface="Carlito"/>
-                <a:cs typeface="Carlito"/>
-              </a:rPr>
-              <a:t>to develop </a:t>
-            </a:r>
-            <a:r>
-              <a:rPr sz="2000" dirty="0">
-                <a:solidFill>
-                  <a:srgbClr val="404040"/>
-                </a:solidFill>
-                <a:latin typeface="Carlito"/>
-                <a:cs typeface="Carlito"/>
-              </a:rPr>
-              <a:t>a machine learning model </a:t>
-            </a:r>
-            <a:r>
-              <a:rPr sz="2000" spc="-25" dirty="0">
-                <a:solidFill>
-                  <a:srgbClr val="404040"/>
-                </a:solidFill>
-                <a:latin typeface="Carlito"/>
-                <a:cs typeface="Carlito"/>
-              </a:rPr>
-              <a:t>for </a:t>
-            </a:r>
-            <a:r>
-              <a:rPr sz="2000" dirty="0">
-                <a:solidFill>
-                  <a:srgbClr val="404040"/>
-                </a:solidFill>
-                <a:latin typeface="Carlito"/>
-                <a:cs typeface="Carlito"/>
-              </a:rPr>
-              <a:t>Space Y who </a:t>
-            </a:r>
-            <a:r>
-              <a:rPr sz="2000" spc="-20" dirty="0">
-                <a:solidFill>
-                  <a:srgbClr val="404040"/>
-                </a:solidFill>
-                <a:latin typeface="Carlito"/>
-                <a:cs typeface="Carlito"/>
-              </a:rPr>
-              <a:t>wants to </a:t>
-            </a:r>
-            <a:r>
-              <a:rPr sz="2000" spc="-5" dirty="0">
-                <a:solidFill>
-                  <a:srgbClr val="404040"/>
-                </a:solidFill>
-                <a:latin typeface="Carlito"/>
-                <a:cs typeface="Carlito"/>
-              </a:rPr>
-              <a:t>bid </a:t>
-            </a:r>
-            <a:r>
-              <a:rPr sz="2000" spc="-20" dirty="0">
-                <a:solidFill>
-                  <a:srgbClr val="404040"/>
-                </a:solidFill>
-                <a:latin typeface="Carlito"/>
-                <a:cs typeface="Carlito"/>
-              </a:rPr>
-              <a:t>against</a:t>
-            </a:r>
-            <a:r>
-              <a:rPr sz="2000" spc="-70" dirty="0">
-                <a:solidFill>
-                  <a:srgbClr val="404040"/>
-                </a:solidFill>
-                <a:latin typeface="Carlito"/>
-                <a:cs typeface="Carlito"/>
-              </a:rPr>
-              <a:t> </a:t>
-            </a:r>
-            <a:r>
-              <a:rPr sz="2000" dirty="0">
-                <a:solidFill>
-                  <a:srgbClr val="404040"/>
-                </a:solidFill>
-                <a:latin typeface="Carlito"/>
-                <a:cs typeface="Carlito"/>
-              </a:rPr>
               <a:t>SpaceX</a:t>
             </a:r>
-            <a:endParaRPr sz="2000">
+            <a:endParaRPr lang="pt-BR" sz="2000" dirty="0">
+              <a:solidFill>
+                <a:srgbClr val="404040"/>
+              </a:solidFill>
               <a:latin typeface="Carlito"/>
               <a:cs typeface="Carlito"/>
             </a:endParaRPr>
@@ -24654,7 +24357,7 @@
                 <a:spcPct val="100000"/>
               </a:lnSpc>
               <a:spcBef>
-                <a:spcPts val="395"/>
+                <a:spcPts val="490"/>
               </a:spcBef>
               <a:buClr>
                 <a:srgbClr val="E28312"/>
@@ -24665,149 +24368,15 @@
               </a:tabLst>
             </a:pPr>
             <a:r>
-              <a:rPr sz="2000" spc="-5" dirty="0">
+              <a:rPr lang="pt-BR" sz="2000" dirty="0">
                 <a:solidFill>
                   <a:srgbClr val="404040"/>
                 </a:solidFill>
                 <a:latin typeface="Carlito"/>
                 <a:cs typeface="Carlito"/>
               </a:rPr>
-              <a:t>The goal </a:t>
-            </a:r>
-            <a:r>
-              <a:rPr sz="2000" dirty="0">
-                <a:solidFill>
-                  <a:srgbClr val="404040"/>
-                </a:solidFill>
-                <a:latin typeface="Carlito"/>
-                <a:cs typeface="Carlito"/>
-              </a:rPr>
-              <a:t>of </a:t>
-            </a:r>
-            <a:r>
-              <a:rPr sz="2000" spc="-5" dirty="0">
-                <a:solidFill>
-                  <a:srgbClr val="404040"/>
-                </a:solidFill>
-                <a:latin typeface="Carlito"/>
-                <a:cs typeface="Carlito"/>
-              </a:rPr>
-              <a:t>model is </a:t>
-            </a:r>
-            <a:r>
-              <a:rPr sz="2000" spc="-20" dirty="0">
-                <a:solidFill>
-                  <a:srgbClr val="404040"/>
-                </a:solidFill>
-                <a:latin typeface="Carlito"/>
-                <a:cs typeface="Carlito"/>
-              </a:rPr>
-              <a:t>to </a:t>
-            </a:r>
-            <a:r>
-              <a:rPr sz="2000" spc="-5" dirty="0">
-                <a:solidFill>
-                  <a:srgbClr val="404040"/>
-                </a:solidFill>
-                <a:latin typeface="Carlito"/>
-                <a:cs typeface="Carlito"/>
-              </a:rPr>
-              <a:t>predict when </a:t>
-            </a:r>
-            <a:r>
-              <a:rPr sz="2000" spc="-15" dirty="0">
-                <a:solidFill>
-                  <a:srgbClr val="404040"/>
-                </a:solidFill>
-                <a:latin typeface="Carlito"/>
-                <a:cs typeface="Carlito"/>
-              </a:rPr>
-              <a:t>Stage </a:t>
-            </a:r>
-            <a:r>
-              <a:rPr sz="2000" dirty="0">
-                <a:solidFill>
-                  <a:srgbClr val="404040"/>
-                </a:solidFill>
-                <a:latin typeface="Carlito"/>
-                <a:cs typeface="Carlito"/>
-              </a:rPr>
-              <a:t>1 </a:t>
-            </a:r>
-            <a:r>
-              <a:rPr sz="2000" spc="-5" dirty="0">
-                <a:solidFill>
-                  <a:srgbClr val="404040"/>
-                </a:solidFill>
-                <a:latin typeface="Carlito"/>
-                <a:cs typeface="Carlito"/>
-              </a:rPr>
-              <a:t>will successfully </a:t>
-            </a:r>
-            <a:r>
-              <a:rPr sz="2000" dirty="0">
-                <a:solidFill>
-                  <a:srgbClr val="404040"/>
-                </a:solidFill>
-                <a:latin typeface="Carlito"/>
-                <a:cs typeface="Carlito"/>
-              </a:rPr>
-              <a:t>land </a:t>
-            </a:r>
-            <a:r>
-              <a:rPr sz="2000" spc="-20" dirty="0">
-                <a:solidFill>
-                  <a:srgbClr val="404040"/>
-                </a:solidFill>
-                <a:latin typeface="Carlito"/>
-                <a:cs typeface="Carlito"/>
-              </a:rPr>
-              <a:t>to </a:t>
-            </a:r>
-            <a:r>
-              <a:rPr sz="2000" spc="-35" dirty="0">
-                <a:solidFill>
-                  <a:srgbClr val="404040"/>
-                </a:solidFill>
-                <a:latin typeface="Carlito"/>
-                <a:cs typeface="Carlito"/>
-              </a:rPr>
-              <a:t>save </a:t>
-            </a:r>
-            <a:r>
-              <a:rPr sz="2000" spc="-5" dirty="0">
-                <a:solidFill>
-                  <a:srgbClr val="404040"/>
-                </a:solidFill>
-                <a:latin typeface="Carlito"/>
-                <a:cs typeface="Carlito"/>
-              </a:rPr>
-              <a:t>~$100 million</a:t>
-            </a:r>
-            <a:r>
-              <a:rPr sz="2000" spc="-110" dirty="0">
-                <a:solidFill>
-                  <a:srgbClr val="404040"/>
-                </a:solidFill>
-                <a:latin typeface="Carlito"/>
-                <a:cs typeface="Carlito"/>
-              </a:rPr>
-              <a:t> </a:t>
-            </a:r>
-            <a:r>
-              <a:rPr sz="2000" dirty="0">
-                <a:solidFill>
-                  <a:srgbClr val="404040"/>
-                </a:solidFill>
-                <a:latin typeface="Carlito"/>
-                <a:cs typeface="Carlito"/>
-              </a:rPr>
-              <a:t>USD</a:t>
-            </a:r>
-            <a:endParaRPr sz="2000">
-              <a:latin typeface="Carlito"/>
-              <a:cs typeface="Carlito"/>
-            </a:endParaRPr>
+              <a:t>O objetivo do modelo é prever quando o Estágio 1 chegará com sucesso para economizar ~ $ 100 milhões de dólares</a:t>
+            </a:r>
           </a:p>
           <a:p>
             <a:pPr marL="195580" indent="-183515">
@@ -24815,7 +24384,7 @@
                 <a:spcPct val="100000"/>
               </a:lnSpc>
               <a:spcBef>
-                <a:spcPts val="409"/>
+                <a:spcPts val="490"/>
               </a:spcBef>
               <a:buClr>
                 <a:srgbClr val="E28312"/>
@@ -24826,109 +24395,55 @@
               </a:tabLst>
             </a:pPr>
             <a:r>
-              <a:rPr sz="2000" spc="-5" dirty="0">
+              <a:rPr lang="pt-BR" sz="2000" dirty="0">
                 <a:solidFill>
                   <a:srgbClr val="404040"/>
                 </a:solidFill>
                 <a:latin typeface="Carlito"/>
                 <a:cs typeface="Carlito"/>
               </a:rPr>
-              <a:t>Used </a:t>
-            </a:r>
-            <a:r>
-              <a:rPr sz="2000" spc="-25" dirty="0">
+              <a:t>Dados usados ​​de uma API pública da </a:t>
+            </a:r>
+            <a:r>
+              <a:rPr lang="pt-BR" sz="2000" dirty="0" err="1">
                 <a:solidFill>
                   <a:srgbClr val="404040"/>
                 </a:solidFill>
                 <a:latin typeface="Carlito"/>
                 <a:cs typeface="Carlito"/>
               </a:rPr>
-              <a:t>data </a:t>
-            </a:r>
-            <a:r>
-              <a:rPr sz="2000" spc="-20" dirty="0">
+              <a:t>SpaceX</a:t>
+            </a:r>
+            <a:r>
+              <a:rPr lang="pt-BR" sz="2000" dirty="0">
                 <a:solidFill>
                   <a:srgbClr val="404040"/>
                 </a:solidFill>
                 <a:latin typeface="Carlito"/>
                 <a:cs typeface="Carlito"/>
               </a:rPr>
-              <a:t>from </a:t>
-            </a:r>
-            <a:r>
-              <a:rPr sz="2000" dirty="0">
+              <a:t> e da página da Wikipedia da </a:t>
+            </a:r>
+            <a:r>
+              <a:rPr lang="pt-BR" sz="2000" dirty="0" err="1">
                 <a:solidFill>
                   <a:srgbClr val="404040"/>
                 </a:solidFill>
                 <a:latin typeface="Carlito"/>
                 <a:cs typeface="Carlito"/>
               </a:rPr>
-              <a:t>a </a:t>
-            </a:r>
-            <a:r>
-              <a:rPr sz="2000" spc="-5" dirty="0">
+              <a:t>SpaceX</a:t>
+            </a:r>
+            <a:r>
+              <a:rPr lang="pt-BR" sz="2000" dirty="0">
                 <a:solidFill>
                   <a:srgbClr val="404040"/>
                 </a:solidFill>
                 <a:latin typeface="Carlito"/>
                 <a:cs typeface="Carlito"/>
               </a:rPr>
-              <a:t>public </a:t>
-            </a:r>
-            <a:r>
-              <a:rPr sz="2000" dirty="0">
-                <a:solidFill>
-                  <a:srgbClr val="404040"/>
-                </a:solidFill>
-                <a:latin typeface="Carlito"/>
-                <a:cs typeface="Carlito"/>
-              </a:rPr>
-              <a:t>SpaceX API and </a:t>
-            </a:r>
-            <a:r>
-              <a:rPr sz="2000" spc="-5" dirty="0">
-                <a:solidFill>
-                  <a:srgbClr val="404040"/>
-                </a:solidFill>
-                <a:latin typeface="Carlito"/>
-                <a:cs typeface="Carlito"/>
-              </a:rPr>
-              <a:t>web scraping </a:t>
-            </a:r>
-            <a:r>
-              <a:rPr sz="2000" dirty="0">
-                <a:solidFill>
-                  <a:srgbClr val="404040"/>
-                </a:solidFill>
-                <a:latin typeface="Carlito"/>
-                <a:cs typeface="Carlito"/>
-              </a:rPr>
-              <a:t>SpaceX Wikipedia</a:t>
-            </a:r>
-            <a:r>
-              <a:rPr sz="2000" spc="-195" dirty="0">
-                <a:solidFill>
-                  <a:srgbClr val="404040"/>
-                </a:solidFill>
-                <a:latin typeface="Carlito"/>
-                <a:cs typeface="Carlito"/>
-              </a:rPr>
-              <a:t> </a:t>
-            </a:r>
-            <a:r>
-              <a:rPr sz="2000" spc="-5" dirty="0">
-                <a:solidFill>
-                  <a:srgbClr val="404040"/>
-                </a:solidFill>
-                <a:latin typeface="Carlito"/>
-                <a:cs typeface="Carlito"/>
-              </a:rPr>
-              <a:t>page</a:t>
-            </a:r>
-            <a:endParaRPr sz="2000">
-              <a:latin typeface="Carlito"/>
-              <a:cs typeface="Carlito"/>
-            </a:endParaRPr>
+              <a:t> na Web</a:t>
+            </a:r>
           </a:p>
           <a:p>
             <a:pPr marL="195580" indent="-183515">
@@ -24936,7 +24451,7 @@
                 <a:spcPct val="100000"/>
               </a:lnSpc>
               <a:spcBef>
-                <a:spcPts val="400"/>
+                <a:spcPts val="490"/>
               </a:spcBef>
               <a:buClr>
                 <a:srgbClr val="E28312"/>
@@ -24947,89 +24462,15 @@
               </a:tabLst>
             </a:pPr>
             <a:r>
-              <a:rPr sz="2000" spc="-25" dirty="0">
+              <a:rPr lang="pt-BR" sz="2000" dirty="0">
                 <a:solidFill>
                   <a:srgbClr val="404040"/>
                 </a:solidFill>
                 <a:latin typeface="Carlito"/>
                 <a:cs typeface="Carlito"/>
               </a:rPr>
-              <a:t>Created data </a:t>
-            </a:r>
-            <a:r>
-              <a:rPr sz="2000" spc="-5" dirty="0">
-                <a:solidFill>
-                  <a:srgbClr val="404040"/>
-                </a:solidFill>
-                <a:latin typeface="Carlito"/>
-                <a:cs typeface="Carlito"/>
-              </a:rPr>
-              <a:t>labels </a:t>
-            </a:r>
-            <a:r>
-              <a:rPr sz="2000" dirty="0">
-                <a:solidFill>
-                  <a:srgbClr val="404040"/>
-                </a:solidFill>
-                <a:latin typeface="Carlito"/>
-                <a:cs typeface="Carlito"/>
-              </a:rPr>
-              <a:t>and </a:t>
-            </a:r>
-            <a:r>
-              <a:rPr sz="2000" spc="-25" dirty="0">
-                <a:solidFill>
-                  <a:srgbClr val="404040"/>
-                </a:solidFill>
-                <a:latin typeface="Carlito"/>
-                <a:cs typeface="Carlito"/>
-              </a:rPr>
-              <a:t>stored data into </a:t>
-            </a:r>
-            <a:r>
-              <a:rPr sz="2000" dirty="0">
-                <a:solidFill>
-                  <a:srgbClr val="404040"/>
-                </a:solidFill>
-                <a:latin typeface="Carlito"/>
-                <a:cs typeface="Carlito"/>
-              </a:rPr>
-              <a:t>a </a:t>
-            </a:r>
-            <a:r>
-              <a:rPr sz="2000" spc="-5" dirty="0">
-                <a:solidFill>
-                  <a:srgbClr val="404040"/>
-                </a:solidFill>
-                <a:latin typeface="Carlito"/>
-                <a:cs typeface="Carlito"/>
-              </a:rPr>
-              <a:t>DB2 SQL</a:t>
-            </a:r>
-            <a:r>
-              <a:rPr sz="2000" spc="-15" dirty="0">
-                <a:solidFill>
-                  <a:srgbClr val="404040"/>
-                </a:solidFill>
-                <a:latin typeface="Carlito"/>
-                <a:cs typeface="Carlito"/>
-              </a:rPr>
-              <a:t> </a:t>
-            </a:r>
-            <a:r>
-              <a:rPr sz="2000" spc="-5" dirty="0">
-                <a:solidFill>
-                  <a:srgbClr val="404040"/>
-                </a:solidFill>
-                <a:latin typeface="Carlito"/>
-                <a:cs typeface="Carlito"/>
-              </a:rPr>
-              <a:t>database</a:t>
-            </a:r>
-            <a:endParaRPr sz="2000">
-              <a:latin typeface="Carlito"/>
-              <a:cs typeface="Carlito"/>
-            </a:endParaRPr>
+              <a:t>Rótulos de dados criados e dados armazenados em um banco de dados DB2 SQL</a:t>
+            </a:r>
           </a:p>
           <a:p>
             <a:pPr marL="195580" indent="-183515">
@@ -25037,7 +24478,7 @@
                 <a:spcPct val="100000"/>
               </a:lnSpc>
               <a:spcBef>
-                <a:spcPts val="395"/>
+                <a:spcPts val="490"/>
               </a:spcBef>
               <a:buClr>
                 <a:srgbClr val="E28312"/>
@@ -25048,69 +24489,15 @@
               </a:tabLst>
             </a:pPr>
             <a:r>
-              <a:rPr sz="2000" spc="-25" dirty="0">
+              <a:rPr lang="pt-BR" sz="2000" dirty="0">
                 <a:solidFill>
                   <a:srgbClr val="404040"/>
                 </a:solidFill>
                 <a:latin typeface="Carlito"/>
                 <a:cs typeface="Carlito"/>
               </a:rPr>
-              <a:t>Created </a:t>
-            </a:r>
-            <a:r>
-              <a:rPr sz="2000" dirty="0">
-                <a:solidFill>
-                  <a:srgbClr val="404040"/>
-                </a:solidFill>
-                <a:latin typeface="Carlito"/>
-                <a:cs typeface="Carlito"/>
-              </a:rPr>
-              <a:t>a </a:t>
-            </a:r>
-            <a:r>
-              <a:rPr sz="2000" spc="-5" dirty="0">
-                <a:solidFill>
-                  <a:srgbClr val="404040"/>
-                </a:solidFill>
-                <a:latin typeface="Carlito"/>
-                <a:cs typeface="Carlito"/>
-              </a:rPr>
-              <a:t>dashboard </a:t>
-            </a:r>
-            <a:r>
-              <a:rPr sz="2000" spc="-25" dirty="0">
-                <a:solidFill>
-                  <a:srgbClr val="404040"/>
-                </a:solidFill>
-                <a:latin typeface="Carlito"/>
-                <a:cs typeface="Carlito"/>
-              </a:rPr>
-              <a:t>for</a:t>
-            </a:r>
-            <a:r>
-              <a:rPr sz="2000" spc="-125" dirty="0">
-                <a:solidFill>
-                  <a:srgbClr val="404040"/>
-                </a:solidFill>
-                <a:latin typeface="Carlito"/>
-                <a:cs typeface="Carlito"/>
-              </a:rPr>
-              <a:t> </a:t>
-            </a:r>
-            <a:r>
-              <a:rPr sz="2000" spc="-20" dirty="0">
-                <a:solidFill>
-                  <a:srgbClr val="404040"/>
-                </a:solidFill>
-                <a:latin typeface="Carlito"/>
-                <a:cs typeface="Carlito"/>
-              </a:rPr>
-              <a:t>visualization</a:t>
-            </a:r>
-            <a:endParaRPr sz="2000">
-              <a:latin typeface="Carlito"/>
-              <a:cs typeface="Carlito"/>
-            </a:endParaRPr>
+              <a:t>Criei um dashboard para visualização</a:t>
+            </a:r>
           </a:p>
           <a:p>
             <a:pPr marL="195580" indent="-183515">
@@ -25118,7 +24505,7 @@
                 <a:spcPct val="100000"/>
               </a:lnSpc>
               <a:spcBef>
-                <a:spcPts val="405"/>
+                <a:spcPts val="490"/>
               </a:spcBef>
               <a:buClr>
                 <a:srgbClr val="E28312"/>
@@ -25129,97 +24516,23 @@
               </a:tabLst>
             </a:pPr>
             <a:r>
-              <a:rPr sz="2000" spc="-50" dirty="0">
+              <a:rPr lang="pt-BR" sz="2000" dirty="0">
                 <a:solidFill>
                   <a:srgbClr val="404040"/>
                 </a:solidFill>
                 <a:latin typeface="Carlito"/>
                 <a:cs typeface="Carlito"/>
               </a:rPr>
-              <a:t>We </a:t>
-            </a:r>
-            <a:r>
-              <a:rPr sz="2000" spc="-25" dirty="0">
-                <a:solidFill>
-                  <a:srgbClr val="404040"/>
-                </a:solidFill>
-                <a:latin typeface="Carlito"/>
-                <a:cs typeface="Carlito"/>
-              </a:rPr>
-              <a:t>created </a:t>
-            </a:r>
-            <a:r>
-              <a:rPr sz="2000" dirty="0">
-                <a:solidFill>
-                  <a:srgbClr val="404040"/>
-                </a:solidFill>
-                <a:latin typeface="Carlito"/>
-                <a:cs typeface="Carlito"/>
-              </a:rPr>
-              <a:t>a machine learning model </a:t>
-            </a:r>
-            <a:r>
-              <a:rPr sz="2000" spc="-5" dirty="0">
-                <a:solidFill>
-                  <a:srgbClr val="404040"/>
-                </a:solidFill>
-                <a:latin typeface="Carlito"/>
-                <a:cs typeface="Carlito"/>
-              </a:rPr>
-              <a:t>with </a:t>
-            </a:r>
-            <a:r>
-              <a:rPr sz="2000" dirty="0">
-                <a:solidFill>
-                  <a:srgbClr val="404040"/>
-                </a:solidFill>
-                <a:latin typeface="Carlito"/>
-                <a:cs typeface="Carlito"/>
-              </a:rPr>
-              <a:t>an </a:t>
-            </a:r>
-            <a:r>
-              <a:rPr sz="2000" spc="-5" dirty="0">
-                <a:solidFill>
-                  <a:srgbClr val="404040"/>
-                </a:solidFill>
-                <a:latin typeface="Carlito"/>
-                <a:cs typeface="Carlito"/>
-              </a:rPr>
-              <a:t>accuracy of</a:t>
-            </a:r>
-            <a:r>
-              <a:rPr sz="2000" spc="-105" dirty="0">
-                <a:solidFill>
-                  <a:srgbClr val="404040"/>
-                </a:solidFill>
-                <a:latin typeface="Carlito"/>
-                <a:cs typeface="Carlito"/>
-              </a:rPr>
-              <a:t> </a:t>
-            </a:r>
-            <a:r>
-              <a:rPr sz="2000" dirty="0">
-                <a:solidFill>
-                  <a:srgbClr val="404040"/>
-                </a:solidFill>
-                <a:latin typeface="Carlito"/>
-                <a:cs typeface="Carlito"/>
-              </a:rPr>
-              <a:t>83%</a:t>
-            </a:r>
-            <a:endParaRPr sz="2000">
-              <a:latin typeface="Carlito"/>
-              <a:cs typeface="Carlito"/>
-            </a:endParaRPr>
-          </a:p>
-          <a:p>
-            <a:pPr marL="195580" marR="276860" indent="-183515">
+              <a:t>Criamos um modelo de aprendizado de máquina com precisão de 83%</a:t>
+            </a:r>
+          </a:p>
+          <a:p>
+            <a:pPr marL="195580" indent="-183515">
               <a:lnSpc>
-                <a:spcPts val="2160"/>
+                <a:spcPct val="100000"/>
               </a:lnSpc>
               <a:spcBef>
-                <a:spcPts val="635"/>
+                <a:spcPts val="490"/>
               </a:spcBef>
               <a:buClr>
                 <a:srgbClr val="E28312"/>
@@ -25230,287 +24543,73 @@
               </a:tabLst>
             </a:pPr>
             <a:r>
-              <a:rPr sz="2000" spc="-5" dirty="0">
+              <a:rPr lang="pt-BR" sz="2000" dirty="0" err="1">
                 <a:solidFill>
                   <a:srgbClr val="404040"/>
                 </a:solidFill>
                 <a:latin typeface="Carlito"/>
                 <a:cs typeface="Carlito"/>
               </a:rPr>
-              <a:t>Allon </a:t>
-            </a:r>
-            <a:r>
-              <a:rPr sz="2000" dirty="0">
+              <a:t>Allon</a:t>
+            </a:r>
+            <a:r>
+              <a:rPr lang="pt-BR" sz="2000" dirty="0">
                 <a:solidFill>
                   <a:srgbClr val="404040"/>
                 </a:solidFill>
                 <a:latin typeface="Carlito"/>
                 <a:cs typeface="Carlito"/>
               </a:rPr>
-              <a:t>Mask </a:t>
-            </a:r>
-            <a:r>
-              <a:rPr sz="2000" spc="-5" dirty="0">
+              <a:t> </a:t>
+            </a:r>
+            <a:r>
+              <a:rPr lang="pt-BR" sz="2000" dirty="0" err="1">
                 <a:solidFill>
                   <a:srgbClr val="404040"/>
                 </a:solidFill>
                 <a:latin typeface="Carlito"/>
                 <a:cs typeface="Carlito"/>
               </a:rPr>
-              <a:t>of </a:t>
-            </a:r>
-            <a:r>
-              <a:rPr sz="2000" dirty="0">
+              <a:t>Mask</a:t>
+            </a:r>
+            <a:r>
+              <a:rPr lang="pt-BR" sz="2000" dirty="0">
                 <a:solidFill>
                   <a:srgbClr val="404040"/>
                 </a:solidFill>
                 <a:latin typeface="Carlito"/>
                 <a:cs typeface="Carlito"/>
               </a:rPr>
-              <a:t>SpaceY </a:t>
-            </a:r>
-            <a:r>
-              <a:rPr sz="2000" spc="-5" dirty="0">
+              <a:t> da </a:t>
+            </a:r>
+            <a:r>
+              <a:rPr lang="pt-BR" sz="2000" dirty="0" err="1">
                 <a:solidFill>
                   <a:srgbClr val="404040"/>
                 </a:solidFill>
                 <a:latin typeface="Carlito"/>
                 <a:cs typeface="Carlito"/>
               </a:rPr>
-              <a:t>can use </a:t>
-            </a:r>
-            <a:r>
-              <a:rPr sz="2000" dirty="0">
+              <a:t>SpaceY</a:t>
+            </a:r>
+            <a:r>
+              <a:rPr lang="pt-BR" sz="2000" dirty="0">
                 <a:solidFill>
                   <a:srgbClr val="404040"/>
                 </a:solidFill>
                 <a:latin typeface="Carlito"/>
                 <a:cs typeface="Carlito"/>
               </a:rPr>
-              <a:t>this model </a:t>
-            </a:r>
-            <a:r>
-              <a:rPr sz="2000" spc="-20" dirty="0">
-                <a:solidFill>
-                  <a:srgbClr val="404040"/>
-                </a:solidFill>
-                <a:latin typeface="Carlito"/>
-                <a:cs typeface="Carlito"/>
-              </a:rPr>
-              <a:t>to </a:t>
-            </a:r>
-            <a:r>
-              <a:rPr sz="2000" spc="-5" dirty="0">
-                <a:solidFill>
-                  <a:srgbClr val="404040"/>
-                </a:solidFill>
-                <a:latin typeface="Carlito"/>
-                <a:cs typeface="Carlito"/>
-              </a:rPr>
-              <a:t>predict with </a:t>
-            </a:r>
-            <a:r>
-              <a:rPr sz="2000" spc="-20" dirty="0">
-                <a:solidFill>
-                  <a:srgbClr val="404040"/>
-                </a:solidFill>
-                <a:latin typeface="Carlito"/>
-                <a:cs typeface="Carlito"/>
-              </a:rPr>
-              <a:t>relatively </a:t>
-            </a:r>
-            <a:r>
-              <a:rPr sz="2000" spc="-5" dirty="0">
-                <a:solidFill>
-                  <a:srgbClr val="404040"/>
-                </a:solidFill>
-                <a:latin typeface="Carlito"/>
-                <a:cs typeface="Carlito"/>
-              </a:rPr>
-              <a:t>high accuracy whether </a:t>
-            </a:r>
-            <a:r>
-              <a:rPr sz="2000" dirty="0">
-                <a:solidFill>
-                  <a:srgbClr val="404040"/>
-                </a:solidFill>
-                <a:latin typeface="Carlito"/>
-                <a:cs typeface="Carlito"/>
-              </a:rPr>
-              <a:t>a  launch </a:t>
-            </a:r>
-            <a:r>
-              <a:rPr sz="2000" spc="-5" dirty="0">
-                <a:solidFill>
-                  <a:srgbClr val="404040"/>
-                </a:solidFill>
-                <a:latin typeface="Carlito"/>
-                <a:cs typeface="Carlito"/>
-              </a:rPr>
-              <a:t>will </a:t>
-            </a:r>
-            <a:r>
-              <a:rPr sz="2000" spc="-35" dirty="0">
-                <a:solidFill>
-                  <a:srgbClr val="404040"/>
-                </a:solidFill>
-                <a:latin typeface="Carlito"/>
-                <a:cs typeface="Carlito"/>
-              </a:rPr>
-              <a:t>have </a:t>
-            </a:r>
-            <a:r>
-              <a:rPr sz="2000" dirty="0">
-                <a:solidFill>
-                  <a:srgbClr val="404040"/>
-                </a:solidFill>
-                <a:latin typeface="Carlito"/>
-                <a:cs typeface="Carlito"/>
-              </a:rPr>
-              <a:t>a </a:t>
-            </a:r>
-            <a:r>
-              <a:rPr sz="2000" spc="-5" dirty="0">
-                <a:solidFill>
-                  <a:srgbClr val="404040"/>
-                </a:solidFill>
-                <a:latin typeface="Carlito"/>
-                <a:cs typeface="Carlito"/>
-              </a:rPr>
-              <a:t>successful </a:t>
-            </a:r>
-            <a:r>
-              <a:rPr sz="2000" spc="-20" dirty="0">
-                <a:solidFill>
-                  <a:srgbClr val="404040"/>
-                </a:solidFill>
-                <a:latin typeface="Carlito"/>
-                <a:cs typeface="Carlito"/>
-              </a:rPr>
-              <a:t>Stage </a:t>
-            </a:r>
-            <a:r>
-              <a:rPr sz="2000" dirty="0">
-                <a:solidFill>
-                  <a:srgbClr val="404040"/>
-                </a:solidFill>
-                <a:latin typeface="Carlito"/>
-                <a:cs typeface="Carlito"/>
-              </a:rPr>
-              <a:t>1 landing </a:t>
-            </a:r>
-            <a:r>
-              <a:rPr sz="2000" spc="-25" dirty="0">
-                <a:solidFill>
-                  <a:srgbClr val="404040"/>
-                </a:solidFill>
-                <a:latin typeface="Carlito"/>
-                <a:cs typeface="Carlito"/>
-              </a:rPr>
-              <a:t>before </a:t>
-            </a:r>
-            <a:r>
-              <a:rPr sz="2000" dirty="0">
-                <a:solidFill>
-                  <a:srgbClr val="404040"/>
-                </a:solidFill>
-                <a:latin typeface="Carlito"/>
-                <a:cs typeface="Carlito"/>
-              </a:rPr>
-              <a:t>launch </a:t>
-            </a:r>
-            <a:r>
-              <a:rPr sz="2000" spc="-20" dirty="0">
-                <a:solidFill>
-                  <a:srgbClr val="404040"/>
-                </a:solidFill>
-                <a:latin typeface="Carlito"/>
-                <a:cs typeface="Carlito"/>
-              </a:rPr>
-              <a:t>to </a:t>
-            </a:r>
-            <a:r>
-              <a:rPr sz="2000" spc="-5" dirty="0">
-                <a:solidFill>
-                  <a:srgbClr val="404040"/>
-                </a:solidFill>
-                <a:latin typeface="Carlito"/>
-                <a:cs typeface="Carlito"/>
-              </a:rPr>
-              <a:t>determine whether </a:t>
-            </a:r>
-            <a:r>
-              <a:rPr sz="2000" dirty="0">
-                <a:solidFill>
-                  <a:srgbClr val="404040"/>
-                </a:solidFill>
-                <a:latin typeface="Carlito"/>
-                <a:cs typeface="Carlito"/>
-              </a:rPr>
-              <a:t>the launch  </a:t>
-            </a:r>
-            <a:r>
-              <a:rPr sz="2000" spc="-5" dirty="0">
-                <a:solidFill>
-                  <a:srgbClr val="404040"/>
-                </a:solidFill>
-                <a:latin typeface="Carlito"/>
-                <a:cs typeface="Carlito"/>
-              </a:rPr>
-              <a:t>should be </a:t>
-            </a:r>
-            <a:r>
-              <a:rPr sz="2000" dirty="0">
-                <a:solidFill>
-                  <a:srgbClr val="404040"/>
-                </a:solidFill>
-                <a:latin typeface="Carlito"/>
-                <a:cs typeface="Carlito"/>
-              </a:rPr>
-              <a:t>made </a:t>
-            </a:r>
-            <a:r>
-              <a:rPr sz="2000" spc="-5" dirty="0">
-                <a:solidFill>
-                  <a:srgbClr val="404040"/>
-                </a:solidFill>
-                <a:latin typeface="Carlito"/>
-                <a:cs typeface="Carlito"/>
-              </a:rPr>
-              <a:t>or</a:t>
-            </a:r>
-            <a:r>
-              <a:rPr sz="2000" spc="-105" dirty="0">
-                <a:solidFill>
-                  <a:srgbClr val="404040"/>
-                </a:solidFill>
-                <a:latin typeface="Carlito"/>
-                <a:cs typeface="Carlito"/>
-              </a:rPr>
-              <a:t> </a:t>
-            </a:r>
-            <a:r>
-              <a:rPr sz="2000" spc="-5" dirty="0">
-                <a:solidFill>
-                  <a:srgbClr val="404040"/>
-                </a:solidFill>
-                <a:latin typeface="Carlito"/>
-                <a:cs typeface="Carlito"/>
-              </a:rPr>
-              <a:t>not</a:t>
-            </a:r>
-            <a:endParaRPr sz="2000">
-              <a:latin typeface="Carlito"/>
-              <a:cs typeface="Carlito"/>
-            </a:endParaRPr>
-          </a:p>
-          <a:p>
-            <a:pPr marL="195580" marR="5080" indent="-183515">
+              <a:t> pode usar esse modelo para prever com precisão relativamente alta se um lançamento terá um pouso bem-sucedido no Estágio 1 antes do lançamento para determinar se o lançamento deve ser feito ou não</a:t>
+            </a:r>
+          </a:p>
+          <a:p>
+            <a:pPr marL="195580" indent="-183515">
               <a:lnSpc>
-                <a:spcPts val="2200"/>
+                <a:spcPct val="100000"/>
               </a:lnSpc>
               <a:spcBef>
-                <a:spcPts val="605"/>
+                <a:spcPts val="490"/>
               </a:spcBef>
               <a:buClr>
                 <a:srgbClr val="E28312"/>
@@ -25521,156 +24620,16 @@
               </a:tabLst>
             </a:pPr>
             <a:r>
-              <a:rPr sz="2000" spc="-5" dirty="0">
+              <a:rPr lang="pt-BR" sz="2000" dirty="0">
                 <a:solidFill>
                   <a:srgbClr val="404040"/>
                 </a:solidFill>
                 <a:latin typeface="Carlito"/>
                 <a:cs typeface="Carlito"/>
               </a:rPr>
-              <a:t>If possible </a:t>
-            </a:r>
-            <a:r>
-              <a:rPr sz="2000" spc="-20" dirty="0">
-                <a:solidFill>
-                  <a:srgbClr val="404040"/>
-                </a:solidFill>
-                <a:latin typeface="Carlito"/>
-                <a:cs typeface="Carlito"/>
-              </a:rPr>
-              <a:t>more </a:t>
-            </a:r>
-            <a:r>
-              <a:rPr sz="2000" spc="-25" dirty="0">
-                <a:solidFill>
-                  <a:srgbClr val="404040"/>
-                </a:solidFill>
-                <a:latin typeface="Carlito"/>
-                <a:cs typeface="Carlito"/>
-              </a:rPr>
-              <a:t>data </a:t>
-            </a:r>
-            <a:r>
-              <a:rPr sz="2000" spc="-5" dirty="0">
-                <a:solidFill>
-                  <a:srgbClr val="404040"/>
-                </a:solidFill>
-                <a:latin typeface="Carlito"/>
-                <a:cs typeface="Carlito"/>
-              </a:rPr>
-              <a:t>should </a:t>
-            </a:r>
-            <a:r>
-              <a:rPr sz="2000" dirty="0">
-                <a:solidFill>
-                  <a:srgbClr val="404040"/>
-                </a:solidFill>
-                <a:latin typeface="Carlito"/>
-                <a:cs typeface="Carlito"/>
-              </a:rPr>
-              <a:t>be </a:t>
-            </a:r>
-            <a:r>
-              <a:rPr sz="2000" spc="-5" dirty="0">
-                <a:solidFill>
-                  <a:srgbClr val="404040"/>
-                </a:solidFill>
-                <a:latin typeface="Carlito"/>
-                <a:cs typeface="Carlito"/>
-              </a:rPr>
-              <a:t>collected </a:t>
-            </a:r>
-            <a:r>
-              <a:rPr sz="2000" spc="-20" dirty="0">
-                <a:solidFill>
-                  <a:srgbClr val="404040"/>
-                </a:solidFill>
-                <a:latin typeface="Carlito"/>
-                <a:cs typeface="Carlito"/>
-              </a:rPr>
-              <a:t>to </a:t>
-            </a:r>
-            <a:r>
-              <a:rPr sz="2000" spc="-25" dirty="0">
-                <a:solidFill>
-                  <a:srgbClr val="404040"/>
-                </a:solidFill>
-                <a:latin typeface="Carlito"/>
-                <a:cs typeface="Carlito"/>
-              </a:rPr>
-              <a:t>better </a:t>
-            </a:r>
-            <a:r>
-              <a:rPr sz="2000" spc="-5" dirty="0">
-                <a:solidFill>
-                  <a:srgbClr val="404040"/>
-                </a:solidFill>
-                <a:latin typeface="Carlito"/>
-                <a:cs typeface="Carlito"/>
-              </a:rPr>
-              <a:t>determine </a:t>
-            </a:r>
-            <a:r>
-              <a:rPr sz="2000" dirty="0">
-                <a:solidFill>
-                  <a:srgbClr val="404040"/>
-                </a:solidFill>
-                <a:latin typeface="Carlito"/>
-                <a:cs typeface="Carlito"/>
-              </a:rPr>
-              <a:t>the </a:t>
-            </a:r>
-            <a:r>
-              <a:rPr sz="2000" spc="-10" dirty="0">
-                <a:solidFill>
-                  <a:srgbClr val="404040"/>
-                </a:solidFill>
-                <a:latin typeface="Carlito"/>
-                <a:cs typeface="Carlito"/>
-              </a:rPr>
-              <a:t>best </a:t>
-            </a:r>
-            <a:r>
-              <a:rPr sz="2000" dirty="0">
-                <a:solidFill>
-                  <a:srgbClr val="404040"/>
-                </a:solidFill>
-                <a:latin typeface="Carlito"/>
-                <a:cs typeface="Carlito"/>
-              </a:rPr>
-              <a:t>machine learning model  and </a:t>
-            </a:r>
-            <a:r>
-              <a:rPr sz="2000" spc="-25" dirty="0">
-                <a:solidFill>
-                  <a:srgbClr val="404040"/>
-                </a:solidFill>
-                <a:latin typeface="Carlito"/>
-                <a:cs typeface="Carlito"/>
-              </a:rPr>
-              <a:t>improve</a:t>
-            </a:r>
-            <a:r>
-              <a:rPr sz="2000" spc="-30" dirty="0">
-                <a:solidFill>
-                  <a:srgbClr val="404040"/>
-                </a:solidFill>
-                <a:latin typeface="Carlito"/>
-                <a:cs typeface="Carlito"/>
-              </a:rPr>
-              <a:t> </a:t>
-            </a:r>
-            <a:r>
-              <a:rPr sz="2000" spc="-5" dirty="0">
-                <a:solidFill>
-                  <a:srgbClr val="404040"/>
-                </a:solidFill>
-                <a:latin typeface="Carlito"/>
-                <a:cs typeface="Carlito"/>
-              </a:rPr>
-              <a:t>accuracy</a:t>
-            </a:r>
-            <a:endParaRPr sz="2000">
+              <a:t>Se possível, mais dados devem ser coletados para determinar melhor o melhor modelo de aprendizado de máquina e melhorar a precisão</a:t>
+            </a:r>
+            <a:endParaRPr sz="2000" dirty="0">
               <a:latin typeface="Carlito"/>
               <a:cs typeface="Carlito"/>
             </a:endParaRPr>
@@ -25912,7 +24871,7 @@
             </a:pPr>
             <a:r>
               <a:rPr spc="-650" dirty="0"/>
-              <a:t>APPENDIX</a:t>
+              <a:t>APENDIX</a:t>
             </a:r>
           </a:p>
         </p:txBody>
@@ -25960,7 +24919,7 @@
         <p:spPr>
           <a:xfrm>
             <a:off x="1176019" y="1496901"/>
-            <a:ext cx="8401050" cy="3782446"/>
+            <a:ext cx="8401050" cy="3051476"/>
           </a:xfrm>
           <a:prstGeom prst="rect">
             <a:avLst/>
@@ -26040,7 +24999,30 @@
               </a:rPr>
               <a:t>url:</a:t>
             </a:r>
-            <a:endParaRPr sz="2000" dirty="0">
+            <a:r>
+              <a:rPr lang="pt-BR" sz="2000" u="heavy" spc="-5" dirty="0">
+                <a:solidFill>
+                  <a:srgbClr val="404040"/>
+                </a:solidFill>
+                <a:uFill>
+                  <a:solidFill>
+                    <a:srgbClr val="404040"/>
+                  </a:solidFill>
+                </a:uFill>
+                <a:latin typeface="Carlito"/>
+                <a:cs typeface="Carlito"/>
+              </a:rPr>
+              <a:t>  </a:t>
+            </a:r>
+            <a:r>
+              <a:rPr lang="pt-BR" sz="1750" dirty="0">
+                <a:latin typeface="Carlito"/>
+                <a:cs typeface="Carlito"/>
+                <a:hlinkClick r:id="rId2"/>
+              </a:rPr>
+              <a:t>https://github.com/yraion/IBM-Data-Science</a:t>
+            </a:r>
+            <a:endParaRPr sz="1750" dirty="0">
               <a:latin typeface="Carlito"/>
               <a:cs typeface="Carlito"/>
             </a:endParaRPr>
@@ -26051,25 +25033,303 @@
                 <a:spcPct val="100000"/>
               </a:lnSpc>
               <a:spcBef>
-                <a:spcPts val="1200"/>
+                <a:spcPts val="5"/>
               </a:spcBef>
             </a:pPr>
             <a:r>
-              <a:rPr lang="en-IN" sz="2000" u="heavy" spc="-10" dirty="0">
-                <a:solidFill>
-                  <a:srgbClr val="800080"/>
+              <a:rPr sz="2000" u="heavy" spc="-5" dirty="0" err="1">
+                <a:solidFill>
+                  <a:srgbClr val="404040"/>
                 </a:solidFill>
                 <a:uFill>
                   <a:solidFill>
-                    <a:srgbClr val="800080"/>
+                    <a:srgbClr val="404040"/>
                   </a:solidFill>
                 </a:uFill>
                 <a:latin typeface="Carlito"/>
                 <a:cs typeface="Carlito"/>
-                <a:hlinkClick r:id="rId2"/>
-              </a:rPr>
-              <a:t>https://github.com/navassherif98/IBM_Data_Science_Professional_Certification</a:t>
-            </a:r>
+              </a:rPr>
+              <a:t>Instru</a:t>
+            </a:r>
+            <a:r>
+              <a:rPr lang="pt-BR" sz="2000" u="heavy" spc="-5" dirty="0">
+                <a:solidFill>
+                  <a:srgbClr val="404040"/>
+                </a:solidFill>
+                <a:uFill>
+                  <a:solidFill>
+                    <a:srgbClr val="404040"/>
+                  </a:solidFill>
+                </a:uFill>
+                <a:latin typeface="Carlito"/>
+                <a:cs typeface="Carlito"/>
+              </a:rPr>
+              <a:t>tore</a:t>
+            </a:r>
+            <a:r>
+              <a:rPr lang="en-IN" sz="2000" u="heavy" spc="-5" dirty="0">
+                <a:solidFill>
+                  <a:srgbClr val="404040"/>
+                </a:solidFill>
+                <a:uFill>
+                  <a:solidFill>
+                    <a:srgbClr val="404040"/>
+                  </a:solidFill>
+                </a:uFill>
+                <a:latin typeface="Carlito"/>
+                <a:cs typeface="Carlito"/>
+              </a:rPr>
+              <a:t>s</a:t>
+            </a:r>
+            <a:r>
+              <a:rPr sz="2000" u="heavy" spc="-5" dirty="0">
+                <a:solidFill>
+                  <a:srgbClr val="404040"/>
+                </a:solidFill>
+                <a:uFill>
+                  <a:solidFill>
+                    <a:srgbClr val="404040"/>
+                  </a:solidFill>
+                </a:uFill>
+                <a:latin typeface="Carlito"/>
+                <a:cs typeface="Carlito"/>
+              </a:rPr>
+              <a:t>:</a:t>
+            </a:r>
+            <a:endParaRPr sz="2000" dirty="0">
+              <a:latin typeface="Carlito"/>
+              <a:cs typeface="Carlito"/>
+            </a:endParaRPr>
+          </a:p>
+          <a:p>
+            <a:pPr algn="l"/>
+            <a:r>
+              <a:rPr lang="en-IN" sz="2000" b="1" i="0" dirty="0" err="1">
+                <a:solidFill>
+                  <a:srgbClr val="24292F"/>
+                </a:solidFill>
+                <a:effectLst/>
+                <a:latin typeface="-apple-system"/>
+              </a:rPr>
+              <a:t>Rav</a:t>
+            </a:r>
+            <a:r>
+              <a:rPr lang="en-IN" sz="2000" b="1" i="0" dirty="0">
+                <a:solidFill>
+                  <a:srgbClr val="24292F"/>
+                </a:solidFill>
+                <a:effectLst/>
+                <a:latin typeface="-apple-system"/>
+              </a:rPr>
+              <a:t> Ahuja, Alex </a:t>
+            </a:r>
+            <a:r>
+              <a:rPr lang="en-IN" sz="2000" b="1" i="0" dirty="0" err="1">
+                <a:solidFill>
+                  <a:srgbClr val="24292F"/>
+                </a:solidFill>
+                <a:effectLst/>
+                <a:latin typeface="-apple-system"/>
+              </a:rPr>
+              <a:t>Aklson</a:t>
+            </a:r>
+            <a:r>
+              <a:rPr lang="en-IN" sz="2000" b="1" i="0" dirty="0">
+                <a:solidFill>
+                  <a:srgbClr val="24292F"/>
+                </a:solidFill>
+                <a:effectLst/>
+                <a:latin typeface="-apple-system"/>
+              </a:rPr>
+              <a:t>, </a:t>
+            </a:r>
+            <a:r>
+              <a:rPr lang="en-IN" sz="2000" b="1" i="0" dirty="0" err="1">
+                <a:solidFill>
+                  <a:srgbClr val="24292F"/>
+                </a:solidFill>
+                <a:effectLst/>
+                <a:latin typeface="-apple-system"/>
+              </a:rPr>
+              <a:t>Aije</a:t>
+            </a:r>
+            <a:r>
+              <a:rPr lang="en-IN" sz="2000" b="1" i="0" dirty="0">
+                <a:solidFill>
+                  <a:srgbClr val="24292F"/>
+                </a:solidFill>
+                <a:effectLst/>
+                <a:latin typeface="-apple-system"/>
+              </a:rPr>
+              <a:t> </a:t>
+            </a:r>
+            <a:r>
+              <a:rPr lang="en-IN" sz="2000" b="1" i="0" dirty="0" err="1">
+                <a:solidFill>
+                  <a:srgbClr val="24292F"/>
+                </a:solidFill>
+                <a:effectLst/>
+                <a:latin typeface="-apple-system"/>
+              </a:rPr>
+              <a:t>Egwaikhide</a:t>
+            </a:r>
+            <a:r>
+              <a:rPr lang="en-IN" sz="2000" b="1" i="0" dirty="0">
+                <a:solidFill>
+                  <a:srgbClr val="24292F"/>
+                </a:solidFill>
+                <a:effectLst/>
+                <a:latin typeface="-apple-system"/>
+              </a:rPr>
+              <a:t>, Svetlana Levitan, Romeo </a:t>
+            </a:r>
+            <a:r>
+              <a:rPr lang="en-IN" sz="2000" b="1" i="0" dirty="0" err="1">
+                <a:solidFill>
+                  <a:srgbClr val="24292F"/>
+                </a:solidFill>
+                <a:effectLst/>
+                <a:latin typeface="-apple-system"/>
+              </a:rPr>
+              <a:t>Kienzler</a:t>
+            </a:r>
+            <a:r>
+              <a:rPr lang="en-IN" sz="2000" b="1" i="0" dirty="0">
+                <a:solidFill>
+                  <a:srgbClr val="24292F"/>
+                </a:solidFill>
+                <a:effectLst/>
+                <a:latin typeface="-apple-system"/>
+              </a:rPr>
+              <a:t>, </a:t>
+            </a:r>
+            <a:r>
+              <a:rPr lang="en-IN" sz="2000" b="1" i="0" dirty="0" err="1">
+                <a:solidFill>
+                  <a:srgbClr val="24292F"/>
+                </a:solidFill>
+                <a:effectLst/>
+                <a:latin typeface="-apple-system"/>
+              </a:rPr>
+              <a:t>Polong</a:t>
+            </a:r>
+            <a:r>
+              <a:rPr lang="en-IN" sz="2000" b="1" i="0" dirty="0">
+                <a:solidFill>
+                  <a:srgbClr val="24292F"/>
+                </a:solidFill>
+                <a:effectLst/>
+                <a:latin typeface="-apple-system"/>
+              </a:rPr>
+              <a:t> Lin, Joseph </a:t>
+            </a:r>
+            <a:r>
+              <a:rPr lang="en-IN" sz="2000" b="1" i="0" dirty="0" err="1">
+                <a:solidFill>
+                  <a:srgbClr val="24292F"/>
+                </a:solidFill>
+                <a:effectLst/>
+                <a:latin typeface="-apple-system"/>
+              </a:rPr>
+              <a:t>Santarcangelo</a:t>
+            </a:r>
+            <a:r>
+              <a:rPr lang="en-IN" sz="2000" b="1" i="0" dirty="0">
+                <a:solidFill>
+                  <a:srgbClr val="24292F"/>
+                </a:solidFill>
+                <a:effectLst/>
+                <a:latin typeface="-apple-system"/>
+              </a:rPr>
+              <a:t>, Azim </a:t>
+            </a:r>
+            <a:r>
+              <a:rPr lang="en-IN" sz="2000" b="1" i="0" dirty="0" err="1">
+                <a:solidFill>
+                  <a:srgbClr val="24292F"/>
+                </a:solidFill>
+                <a:effectLst/>
+                <a:latin typeface="-apple-system"/>
+              </a:rPr>
+              <a:t>Hirjani</a:t>
+            </a:r>
+            <a:r>
+              <a:rPr lang="en-IN" sz="2000" b="1" i="0" dirty="0">
+                <a:solidFill>
+                  <a:srgbClr val="24292F"/>
+                </a:solidFill>
+                <a:effectLst/>
+                <a:latin typeface="-apple-system"/>
+              </a:rPr>
+              <a:t>, </a:t>
+            </a:r>
+            <a:r>
+              <a:rPr lang="en-IN" sz="2000" b="1" i="0" dirty="0" err="1">
+                <a:solidFill>
+                  <a:srgbClr val="24292F"/>
+                </a:solidFill>
+                <a:effectLst/>
+                <a:latin typeface="-apple-system"/>
+              </a:rPr>
+              <a:t>Hima</a:t>
+            </a:r>
+            <a:r>
+              <a:rPr lang="en-IN" sz="2000" b="1" i="0" dirty="0">
+                <a:solidFill>
+                  <a:srgbClr val="24292F"/>
+                </a:solidFill>
+                <a:effectLst/>
+                <a:latin typeface="-apple-system"/>
+              </a:rPr>
+              <a:t> Vasudevan, </a:t>
+            </a:r>
+            <a:r>
+              <a:rPr lang="en-IN" sz="2000" b="1" i="0" dirty="0" err="1">
+                <a:solidFill>
+                  <a:srgbClr val="24292F"/>
+                </a:solidFill>
+                <a:effectLst/>
+                <a:latin typeface="-apple-system"/>
+              </a:rPr>
+              <a:t>Saishruthi</a:t>
+            </a:r>
+            <a:r>
+              <a:rPr lang="en-IN" sz="2000" b="1" i="0" dirty="0">
+                <a:solidFill>
+                  <a:srgbClr val="24292F"/>
+                </a:solidFill>
+                <a:effectLst/>
+                <a:latin typeface="-apple-system"/>
+              </a:rPr>
+              <a:t> Swaminathan, Saeed </a:t>
+            </a:r>
+            <a:r>
+              <a:rPr lang="en-IN" sz="2000" b="1" i="0" dirty="0" err="1">
+                <a:solidFill>
+                  <a:srgbClr val="24292F"/>
+                </a:solidFill>
+                <a:effectLst/>
+                <a:latin typeface="-apple-system"/>
+              </a:rPr>
+              <a:t>Aghabozorgi</a:t>
+            </a:r>
+            <a:r>
+              <a:rPr lang="en-IN" sz="2000" b="1" i="0" dirty="0">
+                <a:solidFill>
+                  <a:srgbClr val="24292F"/>
+                </a:solidFill>
+                <a:effectLst/>
+                <a:latin typeface="-apple-system"/>
+              </a:rPr>
+              <a:t>, Yan Luo</a:t>
+            </a:r>
+          </a:p>
+          <a:p>
+            <a:pPr>
+              <a:lnSpc>
+                <a:spcPct val="100000"/>
+              </a:lnSpc>
+            </a:pPr>
             <a:endParaRPr sz="2000" dirty="0">
               <a:latin typeface="Carlito"/>
               <a:cs typeface="Carlito"/>
@@ -26099,7 +25359,7 @@
               </a:spcBef>
             </a:pPr>
             <a:r>
-              <a:rPr sz="2000" u="heavy" spc="-5" dirty="0">
+              <a:rPr lang="pt-BR" sz="2000" u="heavy" dirty="0">
                 <a:solidFill>
                   <a:srgbClr val="404040"/>
                 </a:solidFill>
@@ -26111,10 +25371,10 @@
                 <a:latin typeface="Carlito"/>
                 <a:cs typeface="Carlito"/>
               </a:rPr>
-              <a:t>Instructor</a:t>
-            </a:r>
-            <a:r>
-              <a:rPr lang="en-IN" sz="2000" u="heavy" spc="-5" dirty="0">
+              <a:t>Agradecimento especial a todos os Instrutores e ao </a:t>
+            </a:r>
+            <a:r>
+              <a:rPr lang="pt-BR" sz="2000" u="heavy" dirty="0" err="1">
                 <a:solidFill>
                   <a:srgbClr val="404040"/>
                 </a:solidFill>
@@ -26126,10 +25386,10 @@
                 <a:latin typeface="Carlito"/>
                 <a:cs typeface="Carlito"/>
               </a:rPr>
-              <a:t>s</a:t>
-            </a:r>
-            <a:r>
-              <a:rPr sz="2000" u="heavy" spc="-5" dirty="0">
+              <a:t>Corsera</a:t>
+            </a:r>
+            <a:r>
+              <a:rPr sz="2000" u="heavy" spc="-20" dirty="0">
                 <a:solidFill>
                   <a:srgbClr val="404040"/>
                 </a:solidFill>
@@ -26142,353 +25402,6 @@
                 <a:cs typeface="Carlito"/>
               </a:rPr>
               <a:t>:</a:t>
-            </a:r>
-            <a:endParaRPr sz="2000" dirty="0">
-              <a:latin typeface="Carlito"/>
-              <a:cs typeface="Carlito"/>
-            </a:endParaRPr>
-          </a:p>
-          <a:p>
-            <a:pPr algn="l"/>
-            <a:r>
-              <a:rPr lang="en-IN" sz="2000" b="1" i="0" dirty="0">
-                <a:solidFill>
-                  <a:srgbClr val="24292F"/>
-                </a:solidFill>
-                <a:effectLst/>
-                <a:latin typeface="-apple-system"/>
-              </a:rPr>
-              <a:t>Instructors: </a:t>
-            </a:r>
-            <a:r>
-              <a:rPr lang="en-IN" sz="2000" b="1" i="0" dirty="0" err="1">
-                <a:solidFill>
-                  <a:srgbClr val="24292F"/>
-                </a:solidFill>
-                <a:effectLst/>
-                <a:latin typeface="-apple-system"/>
-              </a:rPr>
-              <a:t>Rav</a:t>
-            </a:r>
-            <a:r>
-              <a:rPr lang="en-IN" sz="2000" b="1" i="0" dirty="0">
-                <a:solidFill>
-                  <a:srgbClr val="24292F"/>
-                </a:solidFill>
-                <a:effectLst/>
-                <a:latin typeface="-apple-system"/>
-              </a:rPr>
-              <a:t> Ahuja, Alex </a:t>
-            </a:r>
-            <a:r>
-              <a:rPr lang="en-IN" sz="2000" b="1" i="0" dirty="0" err="1">
-                <a:solidFill>
-                  <a:srgbClr val="24292F"/>
-                </a:solidFill>
-                <a:effectLst/>
-                <a:latin typeface="-apple-system"/>
-              </a:rPr>
-              <a:t>Aklson</a:t>
-            </a:r>
-            <a:r>
-              <a:rPr lang="en-IN" sz="2000" b="1" i="0" dirty="0">
-                <a:solidFill>
-                  <a:srgbClr val="24292F"/>
-                </a:solidFill>
-                <a:effectLst/>
-                <a:latin typeface="-apple-system"/>
-              </a:rPr>
-              <a:t>, </a:t>
-            </a:r>
-            <a:r>
-              <a:rPr lang="en-IN" sz="2000" b="1" i="0" dirty="0" err="1">
-                <a:solidFill>
-                  <a:srgbClr val="24292F"/>
-                </a:solidFill>
-                <a:effectLst/>
-                <a:latin typeface="-apple-system"/>
-              </a:rPr>
-              <a:t>Aije</a:t>
-            </a:r>
-            <a:r>
-              <a:rPr lang="en-IN" sz="2000" b="1" i="0" dirty="0">
-                <a:solidFill>
-                  <a:srgbClr val="24292F"/>
-                </a:solidFill>
-                <a:effectLst/>
-                <a:latin typeface="-apple-system"/>
-              </a:rPr>
-              <a:t> </a:t>
-            </a:r>
-            <a:r>
-              <a:rPr lang="en-IN" sz="2000" b="1" i="0" dirty="0" err="1">
-                <a:solidFill>
-                  <a:srgbClr val="24292F"/>
-                </a:solidFill>
-                <a:effectLst/>
-                <a:latin typeface="-apple-system"/>
-              </a:rPr>
-              <a:t>Egwaikhide</a:t>
-            </a:r>
-            <a:r>
-              <a:rPr lang="en-IN" sz="2000" b="1" i="0" dirty="0">
-                <a:solidFill>
-                  <a:srgbClr val="24292F"/>
-                </a:solidFill>
-                <a:effectLst/>
-                <a:latin typeface="-apple-system"/>
-              </a:rPr>
-              <a:t>, Svetlana Levitan, Romeo </a:t>
-            </a:r>
-            <a:r>
-              <a:rPr lang="en-IN" sz="2000" b="1" i="0" dirty="0" err="1">
-                <a:solidFill>
-                  <a:srgbClr val="24292F"/>
-                </a:solidFill>
-                <a:effectLst/>
-                <a:latin typeface="-apple-system"/>
-              </a:rPr>
-              <a:t>Kienzler</a:t>
-            </a:r>
-            <a:r>
-              <a:rPr lang="en-IN" sz="2000" b="1" i="0" dirty="0">
-                <a:solidFill>
-                  <a:srgbClr val="24292F"/>
-                </a:solidFill>
-                <a:effectLst/>
-                <a:latin typeface="-apple-system"/>
-              </a:rPr>
-              <a:t>, </a:t>
-            </a:r>
-            <a:r>
-              <a:rPr lang="en-IN" sz="2000" b="1" i="0" dirty="0" err="1">
-                <a:solidFill>
-                  <a:srgbClr val="24292F"/>
-                </a:solidFill>
-                <a:effectLst/>
-                <a:latin typeface="-apple-system"/>
-              </a:rPr>
-              <a:t>Polong</a:t>
-            </a:r>
-            <a:r>
-              <a:rPr lang="en-IN" sz="2000" b="1" i="0" dirty="0">
-                <a:solidFill>
-                  <a:srgbClr val="24292F"/>
-                </a:solidFill>
-                <a:effectLst/>
-                <a:latin typeface="-apple-system"/>
-              </a:rPr>
-              <a:t> Lin, Joseph </a:t>
-            </a:r>
-            <a:r>
-              <a:rPr lang="en-IN" sz="2000" b="1" i="0" dirty="0" err="1">
-                <a:solidFill>
-                  <a:srgbClr val="24292F"/>
-                </a:solidFill>
-                <a:effectLst/>
-                <a:latin typeface="-apple-system"/>
-              </a:rPr>
-              <a:t>Santarcangelo</a:t>
-            </a:r>
-            <a:r>
-              <a:rPr lang="en-IN" sz="2000" b="1" i="0" dirty="0">
-                <a:solidFill>
-                  <a:srgbClr val="24292F"/>
-                </a:solidFill>
-                <a:effectLst/>
-                <a:latin typeface="-apple-system"/>
-              </a:rPr>
-              <a:t>, Azim </a:t>
-            </a:r>
-            <a:r>
-              <a:rPr lang="en-IN" sz="2000" b="1" i="0" dirty="0" err="1">
-                <a:solidFill>
-                  <a:srgbClr val="24292F"/>
-                </a:solidFill>
-                <a:effectLst/>
-                <a:latin typeface="-apple-system"/>
-              </a:rPr>
-              <a:t>Hirjani</a:t>
-            </a:r>
-            <a:r>
-              <a:rPr lang="en-IN" sz="2000" b="1" i="0" dirty="0">
-                <a:solidFill>
-                  <a:srgbClr val="24292F"/>
-                </a:solidFill>
-                <a:effectLst/>
-                <a:latin typeface="-apple-system"/>
-              </a:rPr>
-              <a:t>, </a:t>
-            </a:r>
-            <a:r>
-              <a:rPr lang="en-IN" sz="2000" b="1" i="0" dirty="0" err="1">
-                <a:solidFill>
-                  <a:srgbClr val="24292F"/>
-                </a:solidFill>
-                <a:effectLst/>
-                <a:latin typeface="-apple-system"/>
-              </a:rPr>
-              <a:t>Hima</a:t>
-            </a:r>
-            <a:r>
-              <a:rPr lang="en-IN" sz="2000" b="1" i="0" dirty="0">
-                <a:solidFill>
-                  <a:srgbClr val="24292F"/>
-                </a:solidFill>
-                <a:effectLst/>
-                <a:latin typeface="-apple-system"/>
-              </a:rPr>
-              <a:t> Vasudevan, </a:t>
-            </a:r>
-            <a:r>
-              <a:rPr lang="en-IN" sz="2000" b="1" i="0" dirty="0" err="1">
-                <a:solidFill>
-                  <a:srgbClr val="24292F"/>
-                </a:solidFill>
-                <a:effectLst/>
-                <a:latin typeface="-apple-system"/>
-              </a:rPr>
-              <a:t>Saishruthi</a:t>
-            </a:r>
-            <a:r>
-              <a:rPr lang="en-IN" sz="2000" b="1" i="0" dirty="0">
-                <a:solidFill>
-                  <a:srgbClr val="24292F"/>
-                </a:solidFill>
-                <a:effectLst/>
-                <a:latin typeface="-apple-system"/>
-              </a:rPr>
-              <a:t> Swaminathan, Saeed </a:t>
-            </a:r>
-            <a:r>
-              <a:rPr lang="en-IN" sz="2000" b="1" i="0" dirty="0" err="1">
-                <a:solidFill>
-                  <a:srgbClr val="24292F"/>
-                </a:solidFill>
-                <a:effectLst/>
-                <a:latin typeface="-apple-system"/>
-              </a:rPr>
-              <a:t>Aghabozorgi</a:t>
-            </a:r>
-            <a:r>
-              <a:rPr lang="en-IN" sz="2000" b="1" i="0" dirty="0">
-                <a:solidFill>
-                  <a:srgbClr val="24292F"/>
-                </a:solidFill>
-                <a:effectLst/>
-                <a:latin typeface="-apple-system"/>
-              </a:rPr>
-              <a:t>, Yan Luo</a:t>
-            </a:r>
-          </a:p>
-          <a:p>
-            <a:pPr>
-              <a:lnSpc>
-                <a:spcPct val="100000"/>
-              </a:lnSpc>
-            </a:pPr>
-            <a:endParaRPr sz="2000" dirty="0">
-              <a:latin typeface="Carlito"/>
-              <a:cs typeface="Carlito"/>
-            </a:endParaRPr>
-          </a:p>
-          <a:p>
-            <a:pPr>
-              <a:lnSpc>
-                <a:spcPct val="100000"/>
-              </a:lnSpc>
-              <a:spcBef>
-                <a:spcPts val="40"/>
-              </a:spcBef>
-            </a:pPr>
-            <a:endParaRPr sz="1750" dirty="0">
-              <a:latin typeface="Carlito"/>
-              <a:cs typeface="Carlito"/>
-            </a:endParaRPr>
-          </a:p>
-          <a:p>
-            <a:pPr marL="12700">
-              <a:lnSpc>
-                <a:spcPct val="100000"/>
-              </a:lnSpc>
-              <a:spcBef>
-                <a:spcPts val="5"/>
-              </a:spcBef>
-            </a:pPr>
-            <a:r>
-              <a:rPr sz="2000" u="heavy" dirty="0">
-                <a:solidFill>
-                  <a:srgbClr val="404040"/>
-                </a:solidFill>
-                <a:uFill>
-                  <a:solidFill>
-                    <a:srgbClr val="404040"/>
-                  </a:solidFill>
-                </a:uFill>
-                <a:latin typeface="Carlito"/>
-                <a:cs typeface="Carlito"/>
-              </a:rPr>
-              <a:t>Special </a:t>
-            </a:r>
-            <a:r>
-              <a:rPr sz="2000" u="heavy" spc="-15" dirty="0">
-                <a:solidFill>
-                  <a:srgbClr val="404040"/>
-                </a:solidFill>
-                <a:uFill>
-                  <a:solidFill>
-                    <a:srgbClr val="404040"/>
-                  </a:solidFill>
-                </a:uFill>
-                <a:latin typeface="Carlito"/>
-                <a:cs typeface="Carlito"/>
-              </a:rPr>
-              <a:t>Thanks </a:t>
-            </a:r>
-            <a:r>
-              <a:rPr sz="2000" u="heavy" spc="-20" dirty="0">
-                <a:solidFill>
-                  <a:srgbClr val="404040"/>
-                </a:solidFill>
-                <a:uFill>
-                  <a:solidFill>
-                    <a:srgbClr val="404040"/>
-                  </a:solidFill>
-                </a:uFill>
-                <a:latin typeface="Carlito"/>
-                <a:cs typeface="Carlito"/>
-              </a:rPr>
-              <a:t>to </a:t>
-            </a:r>
-            <a:r>
-              <a:rPr sz="2000" u="heavy" dirty="0">
-                <a:solidFill>
-                  <a:srgbClr val="404040"/>
-                </a:solidFill>
-                <a:uFill>
-                  <a:solidFill>
-                    <a:srgbClr val="404040"/>
-                  </a:solidFill>
-                </a:uFill>
-                <a:latin typeface="Carlito"/>
-                <a:cs typeface="Carlito"/>
-              </a:rPr>
-              <a:t>All </a:t>
-            </a:r>
-            <a:r>
-              <a:rPr sz="2000" u="heavy" spc="-20" dirty="0">
-                <a:solidFill>
-                  <a:srgbClr val="404040"/>
-                </a:solidFill>
-                <a:uFill>
-                  <a:solidFill>
-                    <a:srgbClr val="404040"/>
-                  </a:solidFill>
-                </a:uFill>
-                <a:latin typeface="Carlito"/>
-                <a:cs typeface="Carlito"/>
-              </a:rPr>
-              <a:t>Instructors:</a:t>
             </a:r>
             <a:endParaRPr sz="2000" dirty="0">
               <a:latin typeface="Carlito"/>
@@ -26725,7 +25638,47 @@
                   </a:solidFill>
                 </a:uFill>
               </a:rPr>
-              <a:t>Methodology	</a:t>
+              <a:t>M</a:t>
+            </a:r>
+            <a:r>
+              <a:rPr lang="pt-BR" u="heavy" spc="-190" dirty="0">
+                <a:uFill>
+                  <a:solidFill>
+                    <a:srgbClr val="7D7D7D"/>
+                  </a:solidFill>
+                </a:uFill>
+              </a:rPr>
+              <a:t>é</a:t>
+            </a:r>
+            <a:r>
+              <a:rPr u="heavy" spc="-190" dirty="0" err="1">
+                <a:uFill>
+                  <a:solidFill>
+                    <a:srgbClr val="7D7D7D"/>
+                  </a:solidFill>
+                </a:uFill>
+              </a:rPr>
+              <a:t>todolog</a:t>
+            </a:r>
+            <a:r>
+              <a:rPr lang="pt-BR" u="heavy" spc="-190" dirty="0">
+                <a:uFill>
+                  <a:solidFill>
+                    <a:srgbClr val="7D7D7D"/>
+                  </a:solidFill>
+                </a:uFill>
+              </a:rPr>
+              <a:t>ia</a:t>
+            </a:r>
+            <a:r>
+              <a:rPr u="heavy" spc="-190" dirty="0">
+                <a:uFill>
+                  <a:solidFill>
+                    <a:srgbClr val="7D7D7D"/>
+                  </a:solidFill>
+                </a:uFill>
+              </a:rPr>
+              <a:t>	</a:t>
             </a:r>
           </a:p>
         </p:txBody>
@@ -27289,9 +26242,39 @@
                 <a:latin typeface="Arial"/>
                 <a:cs typeface="Arial"/>
               </a:rPr>
-              <a:t>Methodology</a:t>
-            </a:r>
-            <a:endParaRPr sz="8000">
+              <a:t>M</a:t>
+            </a:r>
+            <a:r>
+              <a:rPr lang="pt-BR" sz="8000" spc="-285" dirty="0">
+                <a:solidFill>
+                  <a:srgbClr val="242424"/>
+                </a:solidFill>
+                <a:latin typeface="Arial"/>
+                <a:cs typeface="Arial"/>
+              </a:rPr>
+              <a:t>é</a:t>
+            </a:r>
+            <a:r>
+              <a:rPr sz="8000" spc="-285" dirty="0" err="1">
+                <a:solidFill>
+                  <a:srgbClr val="242424"/>
+                </a:solidFill>
+                <a:latin typeface="Arial"/>
+                <a:cs typeface="Arial"/>
+              </a:rPr>
+              <a:t>todolog</a:t>
+            </a:r>
+            <a:r>
+              <a:rPr lang="pt-BR" sz="8000" spc="-285" dirty="0">
+                <a:solidFill>
+                  <a:srgbClr val="242424"/>
+                </a:solidFill>
+                <a:latin typeface="Arial"/>
+                <a:cs typeface="Arial"/>
+              </a:rPr>
+              <a:t>ia</a:t>
+            </a:r>
+            <a:endParaRPr sz="8000" dirty="0">
               <a:latin typeface="Arial"/>
               <a:cs typeface="Arial"/>
             </a:endParaRPr>
@@ -30210,7 +29193,7 @@
         <p:spPr>
           <a:xfrm>
             <a:off x="483680" y="4887130"/>
-            <a:ext cx="2988945" cy="1271117"/>
+            <a:ext cx="2988945" cy="654795"/>
           </a:xfrm>
           <a:prstGeom prst="rect">
             <a:avLst/>
@@ -30244,7 +29227,7 @@
                 <a:cs typeface="Carlito"/>
                 <a:hlinkClick r:id="rId9"/>
               </a:rPr>
-              <a:t>https://github.com/navassherif98/IBM_Data_Science_Professional_Certification/blob/master/10.Applied_Data_Science_Capstone/Week%201%20Introduction/Data%20Collection%20Api%20.ipynb</a:t>
+              <a:t>https://github.com/yraion/IBM-Data-Science/blob/master/01-jupyter-labs-spacex-data-collection-api.ipynb</a:t>
             </a:r>
             <a:endParaRPr sz="1500" dirty="0">
               <a:solidFill>
@@ -31962,7 +30945,7 @@
         <p:spPr>
           <a:xfrm>
             <a:off x="535635" y="4830826"/>
-            <a:ext cx="2988945" cy="1282402"/>
+            <a:ext cx="2988945" cy="659155"/>
           </a:xfrm>
           <a:prstGeom prst="rect">
             <a:avLst/>
@@ -31996,7 +30979,7 @@
                 <a:cs typeface="Carlito"/>
                 <a:hlinkClick r:id="rId2"/>
               </a:rPr>
-              <a:t>https://github.com/navassherif98/IBM_Data_Science_Professional_Certification/blob/master/10.Applied_Data_Science_Capstone/Week%201%20Introduction/Data%20Collection%20with%20Web%20Scraping.ipynb</a:t>
+              <a:t>https://github.com/yraion/IBM-Data-Science/blob/master/02-jupyter-labs-webscraping.ipynb</a:t>
             </a:r>
             <a:endParaRPr lang="en-IN" sz="1500" dirty="0">
               <a:latin typeface="Carlito"/>

</xml_diff>

<commit_message>
Alteraçao no arquivo power point e inclusao de pdf ajustes
</commit_message>
<xml_diff>
--- a/Data Science Journey -IBM -Robson Cruz.pptx
+++ b/Data Science Journey -IBM -Robson Cruz.pptx
@@ -3957,7 +3957,7 @@
         <p:spPr>
           <a:xfrm>
             <a:off x="916635" y="543559"/>
-            <a:ext cx="8733790" cy="756920"/>
+            <a:ext cx="10243616" cy="689932"/>
           </a:xfrm>
           <a:prstGeom prst="rect">
             <a:avLst/>
@@ -3978,31 +3978,11 @@
               </a:spcBef>
             </a:pPr>
             <a:r>
-              <a:rPr spc="-245" dirty="0"/>
-              <a:t>Build </a:t>
-            </a:r>
-            <a:r>
-              <a:rPr spc="-315" dirty="0"/>
-              <a:t>an </a:t>
-            </a:r>
-            <a:r>
-              <a:rPr spc="-190" dirty="0"/>
-              <a:t>interactive </a:t>
-            </a:r>
-            <a:r>
-              <a:rPr spc="-295" dirty="0"/>
-              <a:t>map </a:t>
-            </a:r>
-            <a:r>
-              <a:rPr spc="-45" dirty="0"/>
-              <a:t>with</a:t>
-            </a:r>
-            <a:r>
-              <a:rPr spc="-780" dirty="0"/>
-              <a:t> </a:t>
-            </a:r>
-            <a:r>
-              <a:rPr spc="-270" dirty="0"/>
+              <a:rPr lang="pt-BR" sz="4400" spc="-245" dirty="0"/>
+              <a:t>Construindo um mapa interativo com o </a:t>
+            </a:r>
+            <a:r>
+              <a:rPr sz="4400" spc="-270" dirty="0"/>
               <a:t>Folium</a:t>
             </a:r>
           </a:p>
@@ -4450,7 +4430,7 @@
         <p:spPr>
           <a:xfrm>
             <a:off x="916635" y="543559"/>
-            <a:ext cx="8329295" cy="756920"/>
+            <a:ext cx="10437165" cy="659155"/>
           </a:xfrm>
           <a:prstGeom prst="rect">
             <a:avLst/>
@@ -4471,33 +4451,14 @@
               </a:spcBef>
             </a:pPr>
             <a:r>
-              <a:rPr spc="-245" dirty="0"/>
-              <a:t>Build </a:t>
-            </a:r>
-            <a:r>
-              <a:rPr spc="-415" dirty="0"/>
-              <a:t>a </a:t>
-            </a:r>
-            <a:r>
-              <a:rPr spc="-340" dirty="0"/>
-              <a:t>Dashboard </a:t>
-            </a:r>
-            <a:r>
-              <a:rPr spc="-45" dirty="0"/>
-              <a:t>with </a:t>
-            </a:r>
-            <a:r>
-              <a:rPr spc="-210" dirty="0"/>
-              <a:t>Plotly</a:t>
-            </a:r>
-            <a:r>
-              <a:rPr spc="-800" dirty="0"/>
-              <a:t> </a:t>
-            </a:r>
-            <a:r>
-              <a:rPr spc="-450" dirty="0"/>
-              <a:t>Dash</a:t>
-            </a:r>
+              <a:rPr lang="pt-BR" sz="4200" spc="-245" dirty="0"/>
+              <a:t>Construindo um Dashboard interativo com o </a:t>
+            </a:r>
+            <a:r>
+              <a:rPr lang="pt-BR" sz="4200" spc="-245" dirty="0" err="1"/>
+              <a:t>Potly</a:t>
+            </a:r>
+            <a:endParaRPr sz="4200" spc="-450" dirty="0"/>
           </a:p>
         </p:txBody>
       </p:sp>
@@ -4966,21 +4927,10 @@
               </a:spcBef>
             </a:pPr>
             <a:r>
-              <a:rPr spc="-250" dirty="0"/>
-              <a:t>Predictive </a:t>
-            </a:r>
-            <a:r>
-              <a:rPr spc="-355" dirty="0"/>
-              <a:t>analysis</a:t>
-            </a:r>
-            <a:r>
-              <a:rPr spc="-555" dirty="0"/>
-              <a:t> </a:t>
-            </a:r>
-            <a:r>
-              <a:rPr spc="-280" dirty="0"/>
-              <a:t>(Classification)</a:t>
-            </a:r>
+              <a:rPr lang="pt-BR" spc="-250" dirty="0"/>
+              <a:t>Analise Preditiva(Classificação)</a:t>
+            </a:r>
+            <a:endParaRPr spc="-280" dirty="0"/>
           </a:p>
         </p:txBody>
       </p:sp>
@@ -13674,8 +13624,8 @@
         </p:nvSpPr>
         <p:spPr>
           <a:xfrm>
-            <a:off x="916635" y="543559"/>
-            <a:ext cx="5181600" cy="756920"/>
+            <a:off x="916634" y="543559"/>
+            <a:ext cx="10437165" cy="751488"/>
           </a:xfrm>
           <a:prstGeom prst="rect">
             <a:avLst/>
@@ -13696,25 +13646,10 @@
               </a:spcBef>
             </a:pPr>
             <a:r>
-              <a:rPr spc="-235" dirty="0"/>
-              <a:t>All </a:t>
-            </a:r>
-            <a:r>
-              <a:rPr spc="-400" dirty="0"/>
-              <a:t>Launch </a:t>
-            </a:r>
-            <a:r>
-              <a:rPr spc="-340" dirty="0"/>
-              <a:t>Site</a:t>
-            </a:r>
-            <a:r>
-              <a:rPr spc="-700" dirty="0"/>
-              <a:t> </a:t>
-            </a:r>
-            <a:r>
-              <a:rPr spc="-459" dirty="0"/>
-              <a:t>Names</a:t>
-            </a:r>
+              <a:rPr lang="pt-BR" spc="-235" dirty="0"/>
+              <a:t>Todos os nomes de sites de lançamento</a:t>
+            </a:r>
+            <a:endParaRPr spc="-459" dirty="0"/>
           </a:p>
         </p:txBody>
       </p:sp>
@@ -14168,28 +14103,12 @@
               </a:spcBef>
             </a:pPr>
             <a:r>
-              <a:rPr spc="-400" dirty="0"/>
-              <a:t>Launch </a:t>
-            </a:r>
-            <a:r>
-              <a:rPr spc="-345" dirty="0"/>
-              <a:t>Site </a:t>
-            </a:r>
-            <a:r>
-              <a:rPr spc="-455" dirty="0"/>
-              <a:t>Names </a:t>
-            </a:r>
-            <a:r>
-              <a:rPr spc="-340" dirty="0"/>
-              <a:t>Beginning </a:t>
-            </a:r>
-            <a:r>
-              <a:rPr spc="-80" dirty="0"/>
-              <a:t>with</a:t>
-            </a:r>
-            <a:r>
-              <a:rPr spc="-590" dirty="0"/>
-              <a:t> </a:t>
+              <a:rPr lang="pt-BR" spc="-400" dirty="0" err="1"/>
+              <a:t>Lancamentos</a:t>
+            </a:r>
+            <a:r>
+              <a:rPr lang="pt-BR" spc="-400" dirty="0"/>
+              <a:t> que começam com </a:t>
             </a:r>
             <a:r>
               <a:rPr spc="-630" dirty="0"/>
@@ -14566,8 +14485,8 @@
         </p:nvSpPr>
         <p:spPr>
           <a:xfrm>
-            <a:off x="916635" y="543559"/>
-            <a:ext cx="7138034" cy="756920"/>
+            <a:off x="916634" y="543559"/>
+            <a:ext cx="9827565" cy="751488"/>
           </a:xfrm>
           <a:prstGeom prst="rect">
             <a:avLst/>
@@ -14588,24 +14507,8 @@
               </a:spcBef>
             </a:pPr>
             <a:r>
-              <a:rPr spc="-365" dirty="0"/>
-              <a:t>Total </a:t>
-            </a:r>
-            <a:r>
-              <a:rPr spc="-425" dirty="0"/>
-              <a:t>Payload </a:t>
-            </a:r>
-            <a:r>
-              <a:rPr spc="-434" dirty="0"/>
-              <a:t>Mass </a:t>
-            </a:r>
-            <a:r>
-              <a:rPr spc="-135" dirty="0"/>
-              <a:t>from</a:t>
-            </a:r>
-            <a:r>
-              <a:rPr spc="-580" dirty="0"/>
-              <a:t> </a:t>
+              <a:rPr lang="pt-BR" spc="-365" dirty="0"/>
+              <a:t>Massa total da carga útil da </a:t>
             </a:r>
             <a:r>
               <a:rPr spc="-690" dirty="0"/>
@@ -15064,16 +14967,8 @@
               </a:spcBef>
             </a:pPr>
             <a:r>
-              <a:rPr spc="-425" dirty="0"/>
-              <a:t>Average Payload </a:t>
-            </a:r>
-            <a:r>
-              <a:rPr spc="-434" dirty="0"/>
-              <a:t>Mass </a:t>
-            </a:r>
-            <a:r>
-              <a:rPr spc="-285" dirty="0"/>
-              <a:t>by </a:t>
+              <a:rPr lang="pt-BR" spc="-425" dirty="0"/>
+              <a:t>Massa média da </a:t>
             </a:r>
             <a:r>
               <a:rPr spc="-520" dirty="0"/>
@@ -15479,7 +15374,7 @@
         <p:spPr>
           <a:xfrm>
             <a:off x="916635" y="543559"/>
-            <a:ext cx="9655175" cy="756920"/>
+            <a:ext cx="10665765" cy="751488"/>
           </a:xfrm>
           <a:prstGeom prst="rect">
             <a:avLst/>
@@ -15500,33 +15395,10 @@
               </a:spcBef>
             </a:pPr>
             <a:r>
-              <a:rPr spc="-290" dirty="0"/>
-              <a:t>First </a:t>
-            </a:r>
-            <a:r>
-              <a:rPr spc="-425" dirty="0"/>
-              <a:t>Successful </a:t>
-            </a:r>
-            <a:r>
-              <a:rPr spc="-320" dirty="0"/>
-              <a:t>Ground </a:t>
-            </a:r>
-            <a:r>
-              <a:rPr spc="-545" dirty="0"/>
-              <a:t>Pad </a:t>
-            </a:r>
-            <a:r>
-              <a:rPr spc="-370" dirty="0"/>
-              <a:t>Landing</a:t>
-            </a:r>
-            <a:r>
-              <a:rPr spc="-570" dirty="0"/>
-              <a:t> </a:t>
-            </a:r>
-            <a:r>
-              <a:rPr spc="-340" dirty="0"/>
-              <a:t>Date</a:t>
-            </a:r>
+              <a:rPr lang="pt-BR" spc="-290" dirty="0"/>
+              <a:t>Data da Primeira aterrisagem bem sucedida</a:t>
+            </a:r>
+            <a:endParaRPr spc="-340" dirty="0"/>
           </a:p>
         </p:txBody>
       </p:sp>
@@ -16415,50 +16287,10 @@
               </a:spcBef>
             </a:pPr>
             <a:r>
-              <a:rPr sz="4300" spc="-390" dirty="0"/>
-              <a:t>Successful </a:t>
-            </a:r>
-            <a:r>
-              <a:rPr sz="4300" spc="-300" dirty="0"/>
-              <a:t>Drone </a:t>
-            </a:r>
-            <a:r>
-              <a:rPr sz="4300" spc="-375" dirty="0"/>
-              <a:t>Ship </a:t>
-            </a:r>
-            <a:r>
-              <a:rPr sz="4300" spc="-340" dirty="0"/>
-              <a:t>Landing </a:t>
-            </a:r>
-            <a:r>
-              <a:rPr sz="4300" spc="-75" dirty="0"/>
-              <a:t>with</a:t>
-            </a:r>
-            <a:r>
-              <a:rPr sz="4300" spc="-600" dirty="0"/>
-              <a:t> </a:t>
-            </a:r>
-            <a:r>
-              <a:rPr sz="4300" spc="-385" dirty="0"/>
-              <a:t>Payload  </a:t>
-            </a:r>
-            <a:r>
-              <a:rPr sz="4300" spc="-290" dirty="0"/>
-              <a:t>Between </a:t>
-            </a:r>
-            <a:r>
-              <a:rPr sz="4300" spc="-285" dirty="0"/>
-              <a:t>4000 and</a:t>
-            </a:r>
-            <a:r>
-              <a:rPr sz="4300" spc="-705" dirty="0"/>
-              <a:t> </a:t>
-            </a:r>
-            <a:r>
-              <a:rPr sz="4300" spc="-285" dirty="0"/>
-              <a:t>6000</a:t>
-            </a:r>
-            <a:endParaRPr sz="4300"/>
+              <a:rPr lang="pt-BR" sz="4300" spc="-390" dirty="0"/>
+              <a:t>Desembarque bem-sucedido de drones com carga útil entre 4.000 e 6.000</a:t>
+            </a:r>
+            <a:endParaRPr sz="4300" dirty="0"/>
           </a:p>
         </p:txBody>
       </p:sp>
@@ -18886,45 +18718,22 @@
               </a:tabLst>
             </a:pPr>
             <a:r>
-              <a:rPr u="heavy" spc="-370" dirty="0">
+              <a:rPr lang="pt-BR" u="heavy" spc="-370" dirty="0">
                 <a:uFill>
                   <a:solidFill>
                     <a:srgbClr val="7D7D7D"/>
                   </a:solidFill>
                 </a:uFill>
               </a:rPr>
-              <a:t>Launch </a:t>
-            </a:r>
-            <a:r>
-              <a:rPr u="heavy" spc="-325" dirty="0">
-                <a:uFill>
-                  <a:solidFill>
-                    <a:srgbClr val="7D7D7D"/>
-                  </a:solidFill>
-                </a:uFill>
-              </a:rPr>
-              <a:t>Site</a:t>
-            </a:r>
-            <a:r>
-              <a:rPr u="heavy" spc="-450" dirty="0">
-                <a:uFill>
-                  <a:solidFill>
-                    <a:srgbClr val="7D7D7D"/>
-                  </a:solidFill>
-                </a:uFill>
-              </a:rPr>
-              <a:t> </a:t>
-            </a:r>
-            <a:r>
-              <a:rPr u="heavy" spc="-305" dirty="0">
-                <a:uFill>
-                  <a:solidFill>
-                    <a:srgbClr val="7D7D7D"/>
-                  </a:solidFill>
-                </a:uFill>
-              </a:rPr>
-              <a:t>Locations	</a:t>
-            </a:r>
+              <a:t>Localizações do site de lançamento</a:t>
+            </a:r>
+            <a:endParaRPr u="heavy" spc="-305" dirty="0">
+              <a:uFill>
+                <a:solidFill>
+                  <a:srgbClr val="7D7D7D"/>
+                </a:solidFill>
+              </a:uFill>
+            </a:endParaRPr>
           </a:p>
         </p:txBody>
       </p:sp>
@@ -19206,6 +19015,10 @@
           </p:nvPr>
         </p:nvSpPr>
         <p:spPr>
+          <a:xfrm>
+            <a:off x="1019148" y="260984"/>
+            <a:ext cx="10854539" cy="1309846"/>
+          </a:xfrm>
           <a:prstGeom prst="rect">
             <a:avLst/>
           </a:prstGeom>
@@ -19228,45 +19041,22 @@
               </a:tabLst>
             </a:pPr>
             <a:r>
-              <a:rPr u="heavy" spc="-320" dirty="0">
+              <a:rPr lang="pt-BR" sz="4400" u="heavy" spc="-320" dirty="0">
                 <a:uFill>
                   <a:solidFill>
                     <a:srgbClr val="7D7D7D"/>
                   </a:solidFill>
                 </a:uFill>
               </a:rPr>
-              <a:t>Color-Coded </a:t>
-            </a:r>
-            <a:r>
-              <a:rPr u="heavy" spc="-370" dirty="0">
-                <a:uFill>
-                  <a:solidFill>
-                    <a:srgbClr val="7D7D7D"/>
-                  </a:solidFill>
-                </a:uFill>
-              </a:rPr>
-              <a:t>Launch</a:t>
-            </a:r>
-            <a:r>
-              <a:rPr u="heavy" spc="-530" dirty="0">
-                <a:uFill>
-                  <a:solidFill>
-                    <a:srgbClr val="7D7D7D"/>
-                  </a:solidFill>
-                </a:uFill>
-              </a:rPr>
-              <a:t> </a:t>
-            </a:r>
-            <a:r>
-              <a:rPr u="heavy" spc="-270" dirty="0">
-                <a:uFill>
-                  <a:solidFill>
-                    <a:srgbClr val="7D7D7D"/>
-                  </a:solidFill>
-                </a:uFill>
-              </a:rPr>
-              <a:t>Markers	</a:t>
-            </a:r>
+              <a:t>Marcadores de lançamento codificados por cores</a:t>
+            </a:r>
+            <a:endParaRPr sz="4400" u="heavy" spc="-270" dirty="0">
+              <a:uFill>
+                <a:solidFill>
+                  <a:srgbClr val="7D7D7D"/>
+                </a:solidFill>
+              </a:uFill>
+            </a:endParaRPr>
           </a:p>
         </p:txBody>
       </p:sp>
@@ -20270,7 +20060,7 @@
         <p:spPr>
           <a:xfrm>
             <a:off x="1054100" y="171653"/>
-            <a:ext cx="2997835" cy="757555"/>
+            <a:ext cx="2997835" cy="1490152"/>
           </a:xfrm>
           <a:prstGeom prst="rect">
             <a:avLst/>
@@ -20291,8 +20081,16 @@
               </a:spcBef>
             </a:pPr>
             <a:r>
+              <a:rPr spc="-145" dirty="0" err="1"/>
+              <a:t>Introduc</a:t>
+            </a:r>
+            <a:r>
+              <a:rPr lang="pt-BR" spc="-145" dirty="0" err="1"/>
+              <a:t>ão</a:t>
+            </a:r>
+            <a:r>
               <a:rPr spc="-145" dirty="0"/>
-              <a:t>Introduction</a:t>
+              <a:t>n</a:t>
             </a:r>
           </a:p>
         </p:txBody>
@@ -21246,6 +21044,10 @@
           </p:nvPr>
         </p:nvSpPr>
         <p:spPr>
+          <a:xfrm>
+            <a:off x="1019149" y="260984"/>
+            <a:ext cx="10153700" cy="1371401"/>
+          </a:xfrm>
           <a:prstGeom prst="rect">
             <a:avLst/>
           </a:prstGeom>
@@ -21268,65 +21070,22 @@
               </a:tabLst>
             </a:pPr>
             <a:r>
-              <a:rPr u="heavy" spc="-285" dirty="0">
+              <a:rPr lang="pt-BR" u="heavy" spc="-285" dirty="0">
                 <a:uFill>
                   <a:solidFill>
                     <a:srgbClr val="7D7D7D"/>
                   </a:solidFill>
                 </a:uFill>
               </a:rPr>
-              <a:t>Highest </a:t>
-            </a:r>
-            <a:r>
-              <a:rPr u="heavy" spc="-520" dirty="0">
-                <a:uFill>
-                  <a:solidFill>
-                    <a:srgbClr val="7D7D7D"/>
-                  </a:solidFill>
-                </a:uFill>
-              </a:rPr>
-              <a:t>Success </a:t>
-            </a:r>
-            <a:r>
-              <a:rPr u="heavy" spc="-395" dirty="0">
-                <a:uFill>
-                  <a:solidFill>
-                    <a:srgbClr val="7D7D7D"/>
-                  </a:solidFill>
-                </a:uFill>
-              </a:rPr>
-              <a:t>Rate </a:t>
-            </a:r>
-            <a:r>
-              <a:rPr u="heavy" spc="-370" dirty="0">
-                <a:uFill>
-                  <a:solidFill>
-                    <a:srgbClr val="7D7D7D"/>
-                  </a:solidFill>
-                </a:uFill>
-              </a:rPr>
-              <a:t>Launch</a:t>
-            </a:r>
-            <a:r>
-              <a:rPr u="heavy" spc="-400" dirty="0">
-                <a:uFill>
-                  <a:solidFill>
-                    <a:srgbClr val="7D7D7D"/>
-                  </a:solidFill>
-                </a:uFill>
-              </a:rPr>
-              <a:t> </a:t>
-            </a:r>
-            <a:r>
-              <a:rPr u="heavy" spc="-325" dirty="0">
-                <a:uFill>
-                  <a:solidFill>
-                    <a:srgbClr val="7D7D7D"/>
-                  </a:solidFill>
-                </a:uFill>
-              </a:rPr>
-              <a:t>Site	</a:t>
-            </a:r>
+              <a:t>lançamento com maior taxa de sucesso</a:t>
+            </a:r>
+            <a:endParaRPr u="heavy" spc="-325" dirty="0">
+              <a:uFill>
+                <a:solidFill>
+                  <a:srgbClr val="7D7D7D"/>
+                </a:solidFill>
+              </a:uFill>
+            </a:endParaRPr>
           </a:p>
         </p:txBody>
       </p:sp>
@@ -21798,59 +21557,16 @@
               </a:tabLst>
             </a:pPr>
             <a:r>
-              <a:rPr spc="-385" dirty="0"/>
-              <a:t>Payload </a:t>
-            </a:r>
-            <a:r>
-              <a:rPr spc="-390" dirty="0"/>
-              <a:t>Mass </a:t>
-            </a:r>
-            <a:r>
-              <a:rPr spc="-365" dirty="0"/>
-              <a:t>vs. </a:t>
-            </a:r>
-            <a:r>
-              <a:rPr spc="-520" dirty="0"/>
-              <a:t>Success </a:t>
-            </a:r>
-            <a:r>
-              <a:rPr spc="-365" dirty="0"/>
-              <a:t>vs. </a:t>
-            </a:r>
-            <a:r>
-              <a:rPr spc="-270" dirty="0"/>
-              <a:t>Booster  </a:t>
-            </a:r>
-            <a:r>
-              <a:rPr u="heavy" spc="-330" dirty="0">
-                <a:uFill>
-                  <a:solidFill>
-                    <a:srgbClr val="7D7D7D"/>
-                  </a:solidFill>
-                </a:uFill>
-              </a:rPr>
-              <a:t>Version</a:t>
-            </a:r>
-            <a:r>
-              <a:rPr u="heavy" spc="-409" dirty="0">
-                <a:uFill>
-                  <a:solidFill>
-                    <a:srgbClr val="7D7D7D"/>
-                  </a:solidFill>
-                </a:uFill>
-              </a:rPr>
-              <a:t> </a:t>
-            </a:r>
-            <a:r>
-              <a:rPr u="heavy" spc="-330" dirty="0">
-                <a:uFill>
-                  <a:solidFill>
-                    <a:srgbClr val="7D7D7D"/>
-                  </a:solidFill>
-                </a:uFill>
-              </a:rPr>
-              <a:t>Category	</a:t>
-            </a:r>
+              <a:rPr lang="pt-BR" spc="-385" dirty="0"/>
+              <a:t>Massa de carga útil vs. Sucesso vs. categoria de versão de reforço</a:t>
+            </a:r>
+            <a:endParaRPr u="heavy" spc="-330" dirty="0">
+              <a:uFill>
+                <a:solidFill>
+                  <a:srgbClr val="7D7D7D"/>
+                </a:solidFill>
+              </a:uFill>
+            </a:endParaRPr>
           </a:p>
         </p:txBody>
       </p:sp>

</xml_diff>